<commit_message>
Committing latest updates to course material including code and slides.
</commit_message>
<xml_diff>
--- a/courseMaterial/Objective-5-Describing and Using Objects and Classes/Describing and Using Objects and Classes.pptx
+++ b/courseMaterial/Objective-5-Describing and Using Objects and Classes/Describing and Using Objects and Classes.pptx
@@ -5,27 +5,24 @@
     <p:sldMasterId id="2147483648" r:id="rId4"/>
   </p:sldMasterIdLst>
   <p:notesMasterIdLst>
-    <p:notesMasterId r:id="rId20"/>
+    <p:notesMasterId r:id="rId17"/>
   </p:notesMasterIdLst>
   <p:handoutMasterIdLst>
-    <p:handoutMasterId r:id="rId21"/>
+    <p:handoutMasterId r:id="rId18"/>
   </p:handoutMasterIdLst>
   <p:sldIdLst>
     <p:sldId id="256" r:id="rId5"/>
     <p:sldId id="261" r:id="rId6"/>
     <p:sldId id="257" r:id="rId7"/>
-    <p:sldId id="258" r:id="rId8"/>
-    <p:sldId id="259" r:id="rId9"/>
-    <p:sldId id="272" r:id="rId10"/>
-    <p:sldId id="270" r:id="rId11"/>
-    <p:sldId id="271" r:id="rId12"/>
-    <p:sldId id="263" r:id="rId13"/>
-    <p:sldId id="264" r:id="rId14"/>
-    <p:sldId id="265" r:id="rId15"/>
-    <p:sldId id="266" r:id="rId16"/>
-    <p:sldId id="267" r:id="rId17"/>
-    <p:sldId id="269" r:id="rId18"/>
-    <p:sldId id="268" r:id="rId19"/>
+    <p:sldId id="273" r:id="rId8"/>
+    <p:sldId id="278" r:id="rId9"/>
+    <p:sldId id="280" r:id="rId10"/>
+    <p:sldId id="275" r:id="rId11"/>
+    <p:sldId id="276" r:id="rId12"/>
+    <p:sldId id="279" r:id="rId13"/>
+    <p:sldId id="277" r:id="rId14"/>
+    <p:sldId id="281" r:id="rId15"/>
+    <p:sldId id="268" r:id="rId16"/>
   </p:sldIdLst>
   <p:sldSz cx="12192000" cy="6858000"/>
   <p:notesSz cx="6858000" cy="9144000"/>
@@ -229,7 +226,7 @@
           <a:p>
             <a:fld id="{68416927-5E9C-4E77-85FE-EE4C81C1DE39}" type="datetimeFigureOut">
               <a:rPr lang="en-US" smtClean="0"/>
-              <a:t>3/5/2020</a:t>
+              <a:t>3/23/2020</a:t>
             </a:fld>
             <a:endParaRPr lang="en-US" dirty="0"/>
           </a:p>
@@ -406,7 +403,7 @@
           <a:p>
             <a:fld id="{FA798B7E-6604-4F74-86DB-B30627D56244}" type="datetimeFigureOut">
               <a:rPr lang="en-US" smtClean="0"/>
-              <a:t>3/5/2020</a:t>
+              <a:t>3/23/2020</a:t>
             </a:fld>
             <a:endParaRPr lang="en-US" dirty="0"/>
           </a:p>
@@ -4588,14 +4585,10 @@
           <a:lstStyle/>
           <a:p>
             <a:r>
-              <a:rPr lang="en-US" dirty="0" smtClean="0"/>
-              <a:t>   Dat</a:t>
-            </a:r>
-            <a:r>
-              <a:rPr lang="en-US" dirty="0" smtClean="0"/>
-              <a:t>a Types</a:t>
-            </a:r>
-            <a:endParaRPr lang="en-US" dirty="0"/>
+              <a:rPr lang="en-US" sz="5400" dirty="0" smtClean="0"/>
+              <a:t> Classes &amp; Objects</a:t>
+            </a:r>
+            <a:endParaRPr lang="en-US" sz="5400" dirty="0"/>
           </a:p>
         </p:txBody>
       </p:sp>
@@ -4724,17 +4717,18 @@
         </p:nvSpPr>
         <p:spPr>
           <a:xfrm>
-            <a:off x="838199" y="611079"/>
-            <a:ext cx="10515600" cy="833663"/>
+            <a:off x="838200" y="641855"/>
+            <a:ext cx="10515600" cy="772107"/>
           </a:xfrm>
         </p:spPr>
         <p:txBody>
           <a:bodyPr/>
           <a:lstStyle/>
           <a:p>
+            <a:pPr algn="ctr"/>
             <a:r>
               <a:rPr lang="en-US" dirty="0" smtClean="0"/>
-              <a:t>                          Java File/Class Naming</a:t>
+              <a:t>Accessing Object Members</a:t>
             </a:r>
             <a:endParaRPr lang="en-US" dirty="0"/>
           </a:p>
@@ -4742,13 +4736,7 @@
       </p:sp>
       <p:sp>
         <p:nvSpPr>
-          <p:cNvPr id="3" name="Content Placeholder 2">
-            <a:extLst>
-              <a:ext uri="{FF2B5EF4-FFF2-40B4-BE49-F238E27FC236}">
-                <a16:creationId xmlns:a16="http://schemas.microsoft.com/office/drawing/2014/main" id="{FA6A4B49-27C8-46B6-8B11-AD7E8F615E2C}"/>
-              </a:ext>
-            </a:extLst>
-          </p:cNvPr>
+          <p:cNvPr id="6" name="Content Placeholder 5"/>
           <p:cNvSpPr>
             <a:spLocks noGrp="1"/>
           </p:cNvSpPr>
@@ -4763,19 +4751,83 @@
           </a:bodyPr>
           <a:lstStyle/>
           <a:p>
-            <a:endParaRPr lang="en-US" dirty="0" smtClean="0"/>
-          </a:p>
-          <a:p>
-            <a:endParaRPr lang="en-US" dirty="0"/>
-          </a:p>
-          <a:p>
-            <a:r>
-              <a:rPr lang="en-US" dirty="0" smtClean="0"/>
-              <a:t>Example : Postal addressing system </a:t>
-            </a:r>
-          </a:p>
-          <a:p>
-            <a:endParaRPr lang="en-US" dirty="0" smtClean="0"/>
+            <a:r>
+              <a:rPr lang="en-US" sz="3200" dirty="0" smtClean="0"/>
+              <a:t>Each object has its own personal copy of all member variables of the class.</a:t>
+            </a:r>
+          </a:p>
+          <a:p>
+            <a:r>
+              <a:rPr lang="en-US" sz="3200" dirty="0" smtClean="0"/>
+              <a:t>In order to access the members of the class we make use of dot(.) operator.</a:t>
+            </a:r>
+          </a:p>
+          <a:p>
+            <a:r>
+              <a:rPr lang="en-US" sz="3200" dirty="0" smtClean="0"/>
+              <a:t>Member Variable access :</a:t>
+            </a:r>
+          </a:p>
+          <a:p>
+            <a:pPr lvl="1"/>
+            <a:r>
+              <a:rPr lang="en-US" sz="3200" dirty="0" smtClean="0"/>
+              <a:t>&lt;</a:t>
+            </a:r>
+            <a:r>
+              <a:rPr lang="en-US" sz="3200" dirty="0" err="1" smtClean="0"/>
+              <a:t>referenceVariable</a:t>
+            </a:r>
+            <a:r>
+              <a:rPr lang="en-US" sz="3200" dirty="0" smtClean="0"/>
+              <a:t>&gt;.&lt;</a:t>
+            </a:r>
+            <a:r>
+              <a:rPr lang="en-US" sz="3200" dirty="0" err="1" smtClean="0"/>
+              <a:t>memberVariable</a:t>
+            </a:r>
+            <a:r>
+              <a:rPr lang="en-US" sz="3200" dirty="0" smtClean="0"/>
+              <a:t>&gt;</a:t>
+            </a:r>
+          </a:p>
+          <a:p>
+            <a:r>
+              <a:rPr lang="en-US" sz="3200" dirty="0" smtClean="0"/>
+              <a:t>Member method access : </a:t>
+            </a:r>
+          </a:p>
+          <a:p>
+            <a:pPr lvl="1"/>
+            <a:r>
+              <a:rPr lang="en-US" sz="3200" dirty="0" smtClean="0"/>
+              <a:t>&lt;</a:t>
+            </a:r>
+            <a:r>
+              <a:rPr lang="en-US" sz="3200" dirty="0" err="1" smtClean="0"/>
+              <a:t>referenceVariable</a:t>
+            </a:r>
+            <a:r>
+              <a:rPr lang="en-US" sz="3200" dirty="0" smtClean="0"/>
+              <a:t>&gt;.&lt;</a:t>
+            </a:r>
+            <a:r>
+              <a:rPr lang="en-US" sz="3200" dirty="0" err="1" smtClean="0"/>
+              <a:t>memberMethod</a:t>
+            </a:r>
+            <a:r>
+              <a:rPr lang="en-US" sz="3200" dirty="0" smtClean="0"/>
+              <a:t>&gt;</a:t>
+            </a:r>
+          </a:p>
+          <a:p>
+            <a:endParaRPr lang="en-US" sz="3200" dirty="0" smtClean="0"/>
+          </a:p>
+          <a:p>
+            <a:endParaRPr lang="en-US" sz="3200" dirty="0" smtClean="0"/>
+          </a:p>
+          <a:p>
+            <a:endParaRPr lang="en-US" sz="3200" dirty="0" smtClean="0"/>
           </a:p>
         </p:txBody>
       </p:sp>
@@ -4795,12 +4847,7 @@
             <p:ph type="sldNum" sz="quarter" idx="10"/>
           </p:nvPr>
         </p:nvSpPr>
-        <p:spPr>
-          <a:xfrm>
-            <a:off x="11353800" y="6361475"/>
-            <a:ext cx="838200" cy="360000"/>
-          </a:xfrm>
-        </p:spPr>
+        <p:spPr/>
         <p:txBody>
           <a:bodyPr/>
           <a:lstStyle/>
@@ -4826,7 +4873,7 @@
                 <a16:creationId xmlns:a16="http://schemas.microsoft.com/office/drawing/2014/main" id="{5F253864-26FA-4AB1-9F0A-4F57D870EE85}"/>
               </a:ext>
               <a:ext uri="{C183D7F6-B498-43B3-948B-1728B52AA6E4}">
-                <adec:decorative xmlns:adec="http://schemas.microsoft.com/office/drawing/2017/decorative" xmlns="" val="1"/>
+                <adec:decorative xmlns="" xmlns:adec="http://schemas.microsoft.com/office/drawing/2017/decorative" val="1"/>
               </a:ext>
             </a:extLst>
           </p:cNvPr>
@@ -4876,40 +4923,10 @@
           </a:p>
         </p:txBody>
       </p:sp>
-      <p:pic>
-        <p:nvPicPr>
-          <p:cNvPr id="5" name="Picture 4"/>
-          <p:cNvPicPr>
-            <a:picLocks noChangeAspect="1"/>
-          </p:cNvPicPr>
-          <p:nvPr/>
-        </p:nvPicPr>
-        <p:blipFill>
-          <a:blip r:embed="rId2">
-            <a:extLst>
-              <a:ext uri="{28A0092B-C50C-407E-A947-70E740481C1C}">
-                <a14:useLocalDpi xmlns:a14="http://schemas.microsoft.com/office/drawing/2010/main" val="0"/>
-              </a:ext>
-            </a:extLst>
-          </a:blip>
-          <a:stretch>
-            <a:fillRect/>
-          </a:stretch>
-        </p:blipFill>
-        <p:spPr>
-          <a:xfrm>
-            <a:off x="6871855" y="1917146"/>
-            <a:ext cx="4481944" cy="4444329"/>
-          </a:xfrm>
-          <a:prstGeom prst="rect">
-            <a:avLst/>
-          </a:prstGeom>
-        </p:spPr>
-      </p:pic>
     </p:spTree>
     <p:extLst>
       <p:ext uri="{BB962C8B-B14F-4D97-AF65-F5344CB8AC3E}">
-        <p14:creationId xmlns:p14="http://schemas.microsoft.com/office/powerpoint/2010/main" val="1136810995"/>
+        <p14:creationId xmlns:p14="http://schemas.microsoft.com/office/powerpoint/2010/main" val="2106941509"/>
       </p:ext>
     </p:extLst>
   </p:cSld>
@@ -4961,17 +4978,18 @@
         </p:nvSpPr>
         <p:spPr>
           <a:xfrm>
-            <a:off x="838199" y="611080"/>
-            <a:ext cx="10515600" cy="833663"/>
+            <a:off x="838200" y="641855"/>
+            <a:ext cx="10515600" cy="772107"/>
           </a:xfrm>
         </p:spPr>
         <p:txBody>
           <a:bodyPr/>
           <a:lstStyle/>
           <a:p>
+            <a:pPr algn="ctr"/>
             <a:r>
               <a:rPr lang="en-US" dirty="0" smtClean="0"/>
-              <a:t>  Entry Point to the World of JAVA : Main Method</a:t>
+              <a:t>Others</a:t>
             </a:r>
             <a:endParaRPr lang="en-US" dirty="0"/>
           </a:p>
@@ -4979,13 +4997,7 @@
       </p:sp>
       <p:sp>
         <p:nvSpPr>
-          <p:cNvPr id="3" name="Content Placeholder 2">
-            <a:extLst>
-              <a:ext uri="{FF2B5EF4-FFF2-40B4-BE49-F238E27FC236}">
-                <a16:creationId xmlns:a16="http://schemas.microsoft.com/office/drawing/2014/main" id="{FA6A4B49-27C8-46B6-8B11-AD7E8F615E2C}"/>
-              </a:ext>
-            </a:extLst>
-          </p:cNvPr>
+          <p:cNvPr id="6" name="Content Placeholder 5"/>
           <p:cNvSpPr>
             <a:spLocks noGrp="1"/>
           </p:cNvSpPr>
@@ -5000,34 +5012,14 @@
           </a:bodyPr>
           <a:lstStyle/>
           <a:p>
-            <a:endParaRPr lang="en-US" dirty="0" smtClean="0"/>
-          </a:p>
-          <a:p>
-            <a:endParaRPr lang="en-US" dirty="0"/>
-          </a:p>
-          <a:p>
-            <a:r>
-              <a:rPr lang="en-US" dirty="0" smtClean="0"/>
-              <a:t>Serves as an entry point to any java program. Almost all java programs whether it be a web server written in java or a web application or a desktop application , all begin with a main method and then extend further.</a:t>
-            </a:r>
-          </a:p>
-          <a:p>
-            <a:r>
-              <a:rPr lang="en-US" dirty="0" smtClean="0"/>
-              <a:t>Just like a VISA document acts like an entry point to any country and you need to satisfy all the conditions in order to possess one similar is the case with main method in java.</a:t>
-            </a:r>
-          </a:p>
-          <a:p>
-            <a:r>
-              <a:rPr lang="en-US" dirty="0" smtClean="0"/>
-              <a:t>Source Example : org.java.entrypoint.EntryPoint.java	</a:t>
-            </a:r>
-          </a:p>
-          <a:p>
-            <a:endParaRPr lang="en-US" dirty="0" smtClean="0"/>
-          </a:p>
-          <a:p>
-            <a:endParaRPr lang="en-US" dirty="0" smtClean="0"/>
+            <a:r>
+              <a:rPr lang="en-US" sz="3200" dirty="0" smtClean="0"/>
+              <a:t>The “this” pointer is available for use within the class of the current object. In order to reduce ambiguity in accessing the instance member of the class “this” pointer is used.</a:t>
+            </a:r>
+            <a:endParaRPr lang="en-US" sz="3200" dirty="0" smtClean="0"/>
+          </a:p>
+          <a:p>
+            <a:endParaRPr lang="en-US" sz="3200" dirty="0" smtClean="0"/>
           </a:p>
         </p:txBody>
       </p:sp>
@@ -5047,12 +5039,7 @@
             <p:ph type="sldNum" sz="quarter" idx="10"/>
           </p:nvPr>
         </p:nvSpPr>
-        <p:spPr>
-          <a:xfrm>
-            <a:off x="11353800" y="6361475"/>
-            <a:ext cx="838200" cy="360000"/>
-          </a:xfrm>
-        </p:spPr>
+        <p:spPr/>
         <p:txBody>
           <a:bodyPr/>
           <a:lstStyle/>
@@ -5078,7 +5065,7 @@
                 <a16:creationId xmlns:a16="http://schemas.microsoft.com/office/drawing/2014/main" id="{5F253864-26FA-4AB1-9F0A-4F57D870EE85}"/>
               </a:ext>
               <a:ext uri="{C183D7F6-B498-43B3-948B-1728B52AA6E4}">
-                <adec:decorative xmlns:adec="http://schemas.microsoft.com/office/drawing/2017/decorative" xmlns="" val="1"/>
+                <adec:decorative xmlns="" xmlns:adec="http://schemas.microsoft.com/office/drawing/2017/decorative" val="1"/>
               </a:ext>
             </a:extLst>
           </p:cNvPr>
@@ -5128,40 +5115,10 @@
           </a:p>
         </p:txBody>
       </p:sp>
-      <p:pic>
-        <p:nvPicPr>
-          <p:cNvPr id="6" name="Picture 5"/>
-          <p:cNvPicPr>
-            <a:picLocks noChangeAspect="1"/>
-          </p:cNvPicPr>
-          <p:nvPr/>
-        </p:nvPicPr>
-        <p:blipFill>
-          <a:blip r:embed="rId2" cstate="hqprint">
-            <a:extLst>
-              <a:ext uri="{28A0092B-C50C-407E-A947-70E740481C1C}">
-                <a14:useLocalDpi xmlns:a14="http://schemas.microsoft.com/office/drawing/2010/main" val="0"/>
-              </a:ext>
-            </a:extLst>
-          </a:blip>
-          <a:stretch>
-            <a:fillRect/>
-          </a:stretch>
-        </p:blipFill>
-        <p:spPr>
-          <a:xfrm>
-            <a:off x="7019636" y="1664516"/>
-            <a:ext cx="4334163" cy="4878243"/>
-          </a:xfrm>
-          <a:prstGeom prst="rect">
-            <a:avLst/>
-          </a:prstGeom>
-        </p:spPr>
-      </p:pic>
     </p:spTree>
     <p:extLst>
       <p:ext uri="{BB962C8B-B14F-4D97-AF65-F5344CB8AC3E}">
-        <p14:creationId xmlns:p14="http://schemas.microsoft.com/office/powerpoint/2010/main" val="2944664186"/>
+        <p14:creationId xmlns:p14="http://schemas.microsoft.com/office/powerpoint/2010/main" val="3205322592"/>
       </p:ext>
     </p:extLst>
   </p:cSld>
@@ -5200,892 +5157,6 @@
           <p:cNvPr id="2" name="Title 1">
             <a:extLst>
               <a:ext uri="{FF2B5EF4-FFF2-40B4-BE49-F238E27FC236}">
-                <a16:creationId xmlns:a16="http://schemas.microsoft.com/office/drawing/2014/main" id="{E199600F-A17E-4354-A7AB-0CC2A43A9354}"/>
-              </a:ext>
-            </a:extLst>
-          </p:cNvPr>
-          <p:cNvSpPr>
-            <a:spLocks noGrp="1"/>
-          </p:cNvSpPr>
-          <p:nvPr>
-            <p:ph type="title"/>
-          </p:nvPr>
-        </p:nvSpPr>
-        <p:spPr>
-          <a:xfrm>
-            <a:off x="838199" y="611079"/>
-            <a:ext cx="10515600" cy="833663"/>
-          </a:xfrm>
-        </p:spPr>
-        <p:txBody>
-          <a:bodyPr/>
-          <a:lstStyle/>
-          <a:p>
-            <a:r>
-              <a:rPr lang="en-US" dirty="0" smtClean="0"/>
-              <a:t>                             Exam Perspective</a:t>
-            </a:r>
-            <a:endParaRPr lang="en-US" dirty="0"/>
-          </a:p>
-        </p:txBody>
-      </p:sp>
-      <p:sp>
-        <p:nvSpPr>
-          <p:cNvPr id="3" name="Content Placeholder 2">
-            <a:extLst>
-              <a:ext uri="{FF2B5EF4-FFF2-40B4-BE49-F238E27FC236}">
-                <a16:creationId xmlns:a16="http://schemas.microsoft.com/office/drawing/2014/main" id="{FA6A4B49-27C8-46B6-8B11-AD7E8F615E2C}"/>
-              </a:ext>
-            </a:extLst>
-          </p:cNvPr>
-          <p:cNvSpPr>
-            <a:spLocks noGrp="1"/>
-          </p:cNvSpPr>
-          <p:nvPr>
-            <p:ph idx="1"/>
-          </p:nvPr>
-        </p:nvSpPr>
-        <p:spPr/>
-        <p:txBody>
-          <a:bodyPr>
-            <a:normAutofit/>
-          </a:bodyPr>
-          <a:lstStyle/>
-          <a:p>
-            <a:endParaRPr lang="en-US" noProof="1" smtClean="0"/>
-          </a:p>
-          <a:p>
-            <a:endParaRPr lang="en-US" noProof="1" smtClean="0"/>
-          </a:p>
-          <a:p>
-            <a:r>
-              <a:rPr lang="en-US" noProof="1" smtClean="0"/>
-              <a:t>We could see in the real exam , questions on a valid way of writing the entry point main method.</a:t>
-            </a:r>
-          </a:p>
-          <a:p>
-            <a:r>
-              <a:rPr lang="en-US" noProof="1" smtClean="0"/>
-              <a:t>There are several incorrect ways of writing the entry point program.</a:t>
-            </a:r>
-          </a:p>
-          <a:p>
-            <a:r>
-              <a:rPr lang="en-US" noProof="1" smtClean="0"/>
-              <a:t>In the exam there will be often be a case when the main method is not given.In those cases we nened to assume the presence of a hidden main method.	</a:t>
-            </a:r>
-          </a:p>
-          <a:p>
-            <a:endParaRPr lang="en-US" noProof="1"/>
-          </a:p>
-        </p:txBody>
-      </p:sp>
-      <p:sp>
-        <p:nvSpPr>
-          <p:cNvPr id="4" name="Slide Number Placeholder 3">
-            <a:extLst>
-              <a:ext uri="{FF2B5EF4-FFF2-40B4-BE49-F238E27FC236}">
-                <a16:creationId xmlns:a16="http://schemas.microsoft.com/office/drawing/2014/main" id="{62B4CE3A-8C88-45AA-A849-57E5A7AC22C1}"/>
-              </a:ext>
-            </a:extLst>
-          </p:cNvPr>
-          <p:cNvSpPr>
-            <a:spLocks noGrp="1"/>
-          </p:cNvSpPr>
-          <p:nvPr>
-            <p:ph type="sldNum" sz="quarter" idx="10"/>
-          </p:nvPr>
-        </p:nvSpPr>
-        <p:spPr>
-          <a:xfrm>
-            <a:off x="11353800" y="6361475"/>
-            <a:ext cx="838200" cy="360000"/>
-          </a:xfrm>
-        </p:spPr>
-        <p:txBody>
-          <a:bodyPr/>
-          <a:lstStyle/>
-          <a:p>
-            <a:r>
-              <a:rPr lang="en-US" dirty="0"/>
-              <a:t>PAGE </a:t>
-            </a:r>
-            <a:fld id="{4A9B5881-4007-4345-955A-79C2656F0C49}" type="slidenum">
-              <a:rPr lang="en-US" smtClean="0"/>
-              <a:pPr/>
-              <a:t>12</a:t>
-            </a:fld>
-            <a:endParaRPr lang="en-US" dirty="0"/>
-          </a:p>
-        </p:txBody>
-      </p:sp>
-      <p:sp>
-        <p:nvSpPr>
-          <p:cNvPr id="11" name="Rectangle 10">
-            <a:extLst>
-              <a:ext uri="{FF2B5EF4-FFF2-40B4-BE49-F238E27FC236}">
-                <a16:creationId xmlns:a16="http://schemas.microsoft.com/office/drawing/2014/main" id="{5F253864-26FA-4AB1-9F0A-4F57D870EE85}"/>
-              </a:ext>
-              <a:ext uri="{C183D7F6-B498-43B3-948B-1728B52AA6E4}">
-                <adec:decorative xmlns:adec="http://schemas.microsoft.com/office/drawing/2017/decorative" xmlns="" val="1"/>
-              </a:ext>
-            </a:extLst>
-          </p:cNvPr>
-          <p:cNvSpPr/>
-          <p:nvPr/>
-        </p:nvSpPr>
-        <p:spPr>
-          <a:xfrm>
-            <a:off x="6249555" y="6562004"/>
-            <a:ext cx="2552123" cy="159471"/>
-          </a:xfrm>
-          <a:prstGeom prst="rect">
-            <a:avLst/>
-          </a:prstGeom>
-          <a:solidFill>
-            <a:schemeClr val="tx1">
-              <a:lumMod val="85000"/>
-              <a:lumOff val="15000"/>
-            </a:schemeClr>
-          </a:solidFill>
-          <a:ln>
-            <a:noFill/>
-          </a:ln>
-        </p:spPr>
-        <p:style>
-          <a:lnRef idx="2">
-            <a:schemeClr val="accent1">
-              <a:shade val="50000"/>
-            </a:schemeClr>
-          </a:lnRef>
-          <a:fillRef idx="1">
-            <a:schemeClr val="accent1"/>
-          </a:fillRef>
-          <a:effectRef idx="0">
-            <a:schemeClr val="accent1"/>
-          </a:effectRef>
-          <a:fontRef idx="minor">
-            <a:schemeClr val="lt1"/>
-          </a:fontRef>
-        </p:style>
-        <p:txBody>
-          <a:bodyPr anchor="ctr"/>
-          <a:lstStyle/>
-          <a:p>
-            <a:pPr algn="ctr"/>
-            <a:endParaRPr lang="en-US" sz="1200" dirty="0"/>
-          </a:p>
-        </p:txBody>
-      </p:sp>
-      <p:pic>
-        <p:nvPicPr>
-          <p:cNvPr id="5" name="Picture 4"/>
-          <p:cNvPicPr>
-            <a:picLocks noChangeAspect="1"/>
-          </p:cNvPicPr>
-          <p:nvPr/>
-        </p:nvPicPr>
-        <p:blipFill>
-          <a:blip r:embed="rId2">
-            <a:extLst>
-              <a:ext uri="{28A0092B-C50C-407E-A947-70E740481C1C}">
-                <a14:useLocalDpi xmlns:a14="http://schemas.microsoft.com/office/drawing/2010/main" val="0"/>
-              </a:ext>
-            </a:extLst>
-          </a:blip>
-          <a:stretch>
-            <a:fillRect/>
-          </a:stretch>
-        </p:blipFill>
-        <p:spPr>
-          <a:xfrm>
-            <a:off x="7028873" y="1888319"/>
-            <a:ext cx="4324926" cy="4288644"/>
-          </a:xfrm>
-          <a:prstGeom prst="rect">
-            <a:avLst/>
-          </a:prstGeom>
-        </p:spPr>
-      </p:pic>
-    </p:spTree>
-    <p:extLst>
-      <p:ext uri="{BB962C8B-B14F-4D97-AF65-F5344CB8AC3E}">
-        <p14:creationId xmlns:p14="http://schemas.microsoft.com/office/powerpoint/2010/main" val="3527059924"/>
-      </p:ext>
-    </p:extLst>
-  </p:cSld>
-  <p:clrMapOvr>
-    <a:masterClrMapping/>
-  </p:clrMapOvr>
-  <p:timing>
-    <p:tnLst>
-      <p:par>
-        <p:cTn id="1" dur="indefinite" restart="never" nodeType="tmRoot"/>
-      </p:par>
-    </p:tnLst>
-  </p:timing>
-</p:sld>
-</file>
-
-<file path=ppt/slides/slide13.xml><?xml version="1.0" encoding="utf-8"?>
-<p:sld xmlns:a="http://schemas.openxmlformats.org/drawingml/2006/main" xmlns:r="http://schemas.openxmlformats.org/officeDocument/2006/relationships" xmlns:p="http://schemas.openxmlformats.org/presentationml/2006/main">
-  <p:cSld>
-    <p:spTree>
-      <p:nvGrpSpPr>
-        <p:cNvPr id="1" name=""/>
-        <p:cNvGrpSpPr/>
-        <p:nvPr/>
-      </p:nvGrpSpPr>
-      <p:grpSpPr>
-        <a:xfrm>
-          <a:off x="0" y="0"/>
-          <a:ext cx="0" cy="0"/>
-          <a:chOff x="0" y="0"/>
-          <a:chExt cx="0" cy="0"/>
-        </a:xfrm>
-      </p:grpSpPr>
-      <p:sp>
-        <p:nvSpPr>
-          <p:cNvPr id="2" name="Title 1">
-            <a:extLst>
-              <a:ext uri="{FF2B5EF4-FFF2-40B4-BE49-F238E27FC236}">
-                <a16:creationId xmlns:a16="http://schemas.microsoft.com/office/drawing/2014/main" id="{E199600F-A17E-4354-A7AB-0CC2A43A9354}"/>
-              </a:ext>
-            </a:extLst>
-          </p:cNvPr>
-          <p:cNvSpPr>
-            <a:spLocks noGrp="1"/>
-          </p:cNvSpPr>
-          <p:nvPr>
-            <p:ph type="title"/>
-          </p:nvPr>
-        </p:nvSpPr>
-        <p:spPr>
-          <a:xfrm>
-            <a:off x="838199" y="611079"/>
-            <a:ext cx="10515600" cy="833663"/>
-          </a:xfrm>
-        </p:spPr>
-        <p:txBody>
-          <a:bodyPr/>
-          <a:lstStyle/>
-          <a:p>
-            <a:r>
-              <a:rPr lang="en-US" dirty="0" smtClean="0"/>
-              <a:t>                    Command Line Arguments</a:t>
-            </a:r>
-            <a:endParaRPr lang="en-US" dirty="0"/>
-          </a:p>
-        </p:txBody>
-      </p:sp>
-      <p:sp>
-        <p:nvSpPr>
-          <p:cNvPr id="3" name="Content Placeholder 2">
-            <a:extLst>
-              <a:ext uri="{FF2B5EF4-FFF2-40B4-BE49-F238E27FC236}">
-                <a16:creationId xmlns:a16="http://schemas.microsoft.com/office/drawing/2014/main" id="{FA6A4B49-27C8-46B6-8B11-AD7E8F615E2C}"/>
-              </a:ext>
-            </a:extLst>
-          </p:cNvPr>
-          <p:cNvSpPr>
-            <a:spLocks noGrp="1"/>
-          </p:cNvSpPr>
-          <p:nvPr>
-            <p:ph idx="1"/>
-          </p:nvPr>
-        </p:nvSpPr>
-        <p:spPr>
-          <a:xfrm>
-            <a:off x="838199" y="1825625"/>
-            <a:ext cx="9543473" cy="4351338"/>
-          </a:xfrm>
-        </p:spPr>
-        <p:txBody>
-          <a:bodyPr>
-            <a:normAutofit/>
-          </a:bodyPr>
-          <a:lstStyle/>
-          <a:p>
-            <a:endParaRPr lang="en-US" noProof="1" smtClean="0"/>
-          </a:p>
-          <a:p>
-            <a:r>
-              <a:rPr lang="en-US" noProof="1" smtClean="0"/>
-              <a:t>While running a java program we can pass on some input to the program.</a:t>
-            </a:r>
-          </a:p>
-          <a:p>
-            <a:r>
-              <a:rPr lang="en-US" noProof="1" smtClean="0"/>
-              <a:t>Java reads this input in a String array.</a:t>
-            </a:r>
-          </a:p>
-          <a:p>
-            <a:r>
-              <a:rPr lang="en-US" noProof="1" smtClean="0"/>
-              <a:t>Ways of passing command lines : </a:t>
-            </a:r>
-          </a:p>
-          <a:p>
-            <a:r>
-              <a:rPr lang="en-US" noProof="1" smtClean="0"/>
-              <a:t>a b c</a:t>
-            </a:r>
-          </a:p>
-          <a:p>
-            <a:r>
-              <a:rPr lang="en-US" noProof="1" smtClean="0"/>
-              <a:t>a               b  c</a:t>
-            </a:r>
-          </a:p>
-          <a:p>
-            <a:r>
-              <a:rPr lang="en-US" noProof="1" smtClean="0"/>
-              <a:t>“a ” b c</a:t>
-            </a:r>
-          </a:p>
-          <a:p>
-            <a:r>
-              <a:rPr lang="en-US" noProof="1" smtClean="0"/>
-              <a:t>In case of no arguments an array of zero size is passed.</a:t>
-            </a:r>
-          </a:p>
-          <a:p>
-            <a:r>
-              <a:rPr lang="en-US" noProof="1" smtClean="0"/>
-              <a:t>Example : You want to write a program to display contents of a file that runner of the program wants.The runner of the program would just pass the name of the file that he wants to be displayed on command line and the program would display it.</a:t>
-            </a:r>
-          </a:p>
-          <a:p>
-            <a:endParaRPr lang="en-US" noProof="1" smtClean="0"/>
-          </a:p>
-          <a:p>
-            <a:endParaRPr lang="en-US" noProof="1"/>
-          </a:p>
-        </p:txBody>
-      </p:sp>
-      <p:sp>
-        <p:nvSpPr>
-          <p:cNvPr id="4" name="Slide Number Placeholder 3">
-            <a:extLst>
-              <a:ext uri="{FF2B5EF4-FFF2-40B4-BE49-F238E27FC236}">
-                <a16:creationId xmlns:a16="http://schemas.microsoft.com/office/drawing/2014/main" id="{62B4CE3A-8C88-45AA-A849-57E5A7AC22C1}"/>
-              </a:ext>
-            </a:extLst>
-          </p:cNvPr>
-          <p:cNvSpPr>
-            <a:spLocks noGrp="1"/>
-          </p:cNvSpPr>
-          <p:nvPr>
-            <p:ph type="sldNum" sz="quarter" idx="10"/>
-          </p:nvPr>
-        </p:nvSpPr>
-        <p:spPr>
-          <a:xfrm>
-            <a:off x="11353800" y="6361475"/>
-            <a:ext cx="838200" cy="360000"/>
-          </a:xfrm>
-        </p:spPr>
-        <p:txBody>
-          <a:bodyPr/>
-          <a:lstStyle/>
-          <a:p>
-            <a:r>
-              <a:rPr lang="en-US" dirty="0"/>
-              <a:t>PAGE </a:t>
-            </a:r>
-            <a:fld id="{4A9B5881-4007-4345-955A-79C2656F0C49}" type="slidenum">
-              <a:rPr lang="en-US" smtClean="0"/>
-              <a:pPr/>
-              <a:t>13</a:t>
-            </a:fld>
-            <a:endParaRPr lang="en-US" dirty="0"/>
-          </a:p>
-        </p:txBody>
-      </p:sp>
-      <p:sp>
-        <p:nvSpPr>
-          <p:cNvPr id="11" name="Rectangle 10">
-            <a:extLst>
-              <a:ext uri="{FF2B5EF4-FFF2-40B4-BE49-F238E27FC236}">
-                <a16:creationId xmlns:a16="http://schemas.microsoft.com/office/drawing/2014/main" id="{5F253864-26FA-4AB1-9F0A-4F57D870EE85}"/>
-              </a:ext>
-              <a:ext uri="{C183D7F6-B498-43B3-948B-1728B52AA6E4}">
-                <adec:decorative xmlns:adec="http://schemas.microsoft.com/office/drawing/2017/decorative" xmlns="" val="1"/>
-              </a:ext>
-            </a:extLst>
-          </p:cNvPr>
-          <p:cNvSpPr/>
-          <p:nvPr/>
-        </p:nvSpPr>
-        <p:spPr>
-          <a:xfrm>
-            <a:off x="6249555" y="6562004"/>
-            <a:ext cx="2552123" cy="159471"/>
-          </a:xfrm>
-          <a:prstGeom prst="rect">
-            <a:avLst/>
-          </a:prstGeom>
-          <a:solidFill>
-            <a:schemeClr val="tx1">
-              <a:lumMod val="85000"/>
-              <a:lumOff val="15000"/>
-            </a:schemeClr>
-          </a:solidFill>
-          <a:ln>
-            <a:noFill/>
-          </a:ln>
-        </p:spPr>
-        <p:style>
-          <a:lnRef idx="2">
-            <a:schemeClr val="accent1">
-              <a:shade val="50000"/>
-            </a:schemeClr>
-          </a:lnRef>
-          <a:fillRef idx="1">
-            <a:schemeClr val="accent1"/>
-          </a:fillRef>
-          <a:effectRef idx="0">
-            <a:schemeClr val="accent1"/>
-          </a:effectRef>
-          <a:fontRef idx="minor">
-            <a:schemeClr val="lt1"/>
-          </a:fontRef>
-        </p:style>
-        <p:txBody>
-          <a:bodyPr anchor="ctr"/>
-          <a:lstStyle/>
-          <a:p>
-            <a:pPr algn="ctr"/>
-            <a:endParaRPr lang="en-US" sz="1200" dirty="0"/>
-          </a:p>
-        </p:txBody>
-      </p:sp>
-      <p:sp>
-        <p:nvSpPr>
-          <p:cNvPr id="5" name="Rectangle 4"/>
-          <p:cNvSpPr/>
-          <p:nvPr/>
-        </p:nvSpPr>
-        <p:spPr>
-          <a:xfrm>
-            <a:off x="5785658" y="3244334"/>
-            <a:ext cx="620683" cy="369332"/>
-          </a:xfrm>
-          <a:prstGeom prst="rect">
-            <a:avLst/>
-          </a:prstGeom>
-        </p:spPr>
-        <p:txBody>
-          <a:bodyPr wrap="none">
-            <a:spAutoFit/>
-          </a:bodyPr>
-          <a:lstStyle/>
-          <a:p>
-            <a:r>
-              <a:rPr lang="en-US" dirty="0"/>
-              <a:t>a b c</a:t>
-            </a:r>
-          </a:p>
-        </p:txBody>
-      </p:sp>
-      <p:sp>
-        <p:nvSpPr>
-          <p:cNvPr id="6" name="Rectangle 5"/>
-          <p:cNvSpPr/>
-          <p:nvPr/>
-        </p:nvSpPr>
-        <p:spPr>
-          <a:xfrm>
-            <a:off x="5785658" y="3244334"/>
-            <a:ext cx="620683" cy="369332"/>
-          </a:xfrm>
-          <a:prstGeom prst="rect">
-            <a:avLst/>
-          </a:prstGeom>
-        </p:spPr>
-        <p:txBody>
-          <a:bodyPr wrap="none">
-            <a:spAutoFit/>
-          </a:bodyPr>
-          <a:lstStyle/>
-          <a:p>
-            <a:r>
-              <a:rPr lang="en-US" dirty="0"/>
-              <a:t>a b c</a:t>
-            </a:r>
-          </a:p>
-        </p:txBody>
-      </p:sp>
-    </p:spTree>
-    <p:extLst>
-      <p:ext uri="{BB962C8B-B14F-4D97-AF65-F5344CB8AC3E}">
-        <p14:creationId xmlns:p14="http://schemas.microsoft.com/office/powerpoint/2010/main" val="454014491"/>
-      </p:ext>
-    </p:extLst>
-  </p:cSld>
-  <p:clrMapOvr>
-    <a:masterClrMapping/>
-  </p:clrMapOvr>
-  <p:timing>
-    <p:tnLst>
-      <p:par>
-        <p:cTn id="1" dur="indefinite" restart="never" nodeType="tmRoot"/>
-      </p:par>
-    </p:tnLst>
-  </p:timing>
-</p:sld>
-</file>
-
-<file path=ppt/slides/slide14.xml><?xml version="1.0" encoding="utf-8"?>
-<p:sld xmlns:a="http://schemas.openxmlformats.org/drawingml/2006/main" xmlns:r="http://schemas.openxmlformats.org/officeDocument/2006/relationships" xmlns:p="http://schemas.openxmlformats.org/presentationml/2006/main">
-  <p:cSld>
-    <p:spTree>
-      <p:nvGrpSpPr>
-        <p:cNvPr id="1" name=""/>
-        <p:cNvGrpSpPr/>
-        <p:nvPr/>
-      </p:nvGrpSpPr>
-      <p:grpSpPr>
-        <a:xfrm>
-          <a:off x="0" y="0"/>
-          <a:ext cx="0" cy="0"/>
-          <a:chOff x="0" y="0"/>
-          <a:chExt cx="0" cy="0"/>
-        </a:xfrm>
-      </p:grpSpPr>
-      <p:sp>
-        <p:nvSpPr>
-          <p:cNvPr id="2" name="Title 1">
-            <a:extLst>
-              <a:ext uri="{FF2B5EF4-FFF2-40B4-BE49-F238E27FC236}">
-                <a16:creationId xmlns:a16="http://schemas.microsoft.com/office/drawing/2014/main" id="{E199600F-A17E-4354-A7AB-0CC2A43A9354}"/>
-              </a:ext>
-            </a:extLst>
-          </p:cNvPr>
-          <p:cNvSpPr>
-            <a:spLocks noGrp="1"/>
-          </p:cNvSpPr>
-          <p:nvPr>
-            <p:ph type="title"/>
-          </p:nvPr>
-        </p:nvSpPr>
-        <p:spPr>
-          <a:xfrm>
-            <a:off x="838199" y="611079"/>
-            <a:ext cx="10515600" cy="833663"/>
-          </a:xfrm>
-        </p:spPr>
-        <p:txBody>
-          <a:bodyPr/>
-          <a:lstStyle/>
-          <a:p>
-            <a:r>
-              <a:rPr lang="en-US" dirty="0" smtClean="0"/>
-              <a:t>                         Compiling &amp; Running </a:t>
-            </a:r>
-            <a:endParaRPr lang="en-US" dirty="0"/>
-          </a:p>
-        </p:txBody>
-      </p:sp>
-      <p:sp>
-        <p:nvSpPr>
-          <p:cNvPr id="3" name="Content Placeholder 2">
-            <a:extLst>
-              <a:ext uri="{FF2B5EF4-FFF2-40B4-BE49-F238E27FC236}">
-                <a16:creationId xmlns:a16="http://schemas.microsoft.com/office/drawing/2014/main" id="{FA6A4B49-27C8-46B6-8B11-AD7E8F615E2C}"/>
-              </a:ext>
-            </a:extLst>
-          </p:cNvPr>
-          <p:cNvSpPr>
-            <a:spLocks noGrp="1"/>
-          </p:cNvSpPr>
-          <p:nvPr>
-            <p:ph idx="1"/>
-          </p:nvPr>
-        </p:nvSpPr>
-        <p:spPr>
-          <a:xfrm>
-            <a:off x="838199" y="1825625"/>
-            <a:ext cx="9543473" cy="4351338"/>
-          </a:xfrm>
-        </p:spPr>
-        <p:txBody>
-          <a:bodyPr>
-            <a:normAutofit/>
-          </a:bodyPr>
-          <a:lstStyle/>
-          <a:p>
-            <a:r>
-              <a:rPr lang="en-US" noProof="1" smtClean="0"/>
-              <a:t>In the beginning it is important to understand the semantics of running a java program from command line.</a:t>
-            </a:r>
-          </a:p>
-          <a:p>
-            <a:r>
-              <a:rPr lang="en-US" noProof="1" smtClean="0"/>
-              <a:t>Refrain from using any IDE for some time.</a:t>
-            </a:r>
-          </a:p>
-          <a:p>
-            <a:r>
-              <a:rPr lang="en-US" noProof="1" smtClean="0"/>
-              <a:t>Javac &amp; java are the two tools that JDK provides to compile and execute your program respectively.</a:t>
-            </a:r>
-          </a:p>
-          <a:p>
-            <a:r>
-              <a:rPr lang="en-US" b="1" noProof="1"/>
-              <a:t>j</a:t>
-            </a:r>
-            <a:r>
-              <a:rPr lang="en-US" b="1" noProof="1" smtClean="0"/>
-              <a:t>avac WelcomeToJava.java</a:t>
-            </a:r>
-            <a:r>
-              <a:rPr lang="en-US" noProof="1" smtClean="0"/>
-              <a:t> creates WelcomeToJava.class file.</a:t>
-            </a:r>
-          </a:p>
-          <a:p>
-            <a:r>
-              <a:rPr lang="en-US" b="1" noProof="1" smtClean="0"/>
-              <a:t>Java WelcomeToJava</a:t>
-            </a:r>
-            <a:r>
-              <a:rPr lang="en-US" noProof="1" smtClean="0"/>
-              <a:t> runs the program.</a:t>
-            </a:r>
-          </a:p>
-          <a:p>
-            <a:r>
-              <a:rPr lang="en-US" noProof="1" smtClean="0"/>
-              <a:t>Package declaration is not just a logical segregation but physical also.</a:t>
-            </a:r>
-          </a:p>
-          <a:p>
-            <a:r>
-              <a:rPr lang="en-US" noProof="1"/>
-              <a:t>Format for running a java program : </a:t>
-            </a:r>
-            <a:r>
-              <a:rPr lang="en-US" noProof="1" smtClean="0"/>
-              <a:t>java &lt;</a:t>
-            </a:r>
-            <a:r>
-              <a:rPr lang="en-US" noProof="1"/>
-              <a:t>packageName&gt;.&lt;MainClassName&gt;</a:t>
-            </a:r>
-          </a:p>
-          <a:p>
-            <a:endParaRPr lang="en-US" noProof="1" smtClean="0"/>
-          </a:p>
-          <a:p>
-            <a:endParaRPr lang="en-US" noProof="1" smtClean="0"/>
-          </a:p>
-          <a:p>
-            <a:endParaRPr lang="en-US" noProof="1" smtClean="0"/>
-          </a:p>
-          <a:p>
-            <a:endParaRPr lang="en-US" noProof="1" smtClean="0"/>
-          </a:p>
-          <a:p>
-            <a:endParaRPr lang="en-US" noProof="1"/>
-          </a:p>
-        </p:txBody>
-      </p:sp>
-      <p:sp>
-        <p:nvSpPr>
-          <p:cNvPr id="4" name="Slide Number Placeholder 3">
-            <a:extLst>
-              <a:ext uri="{FF2B5EF4-FFF2-40B4-BE49-F238E27FC236}">
-                <a16:creationId xmlns:a16="http://schemas.microsoft.com/office/drawing/2014/main" id="{62B4CE3A-8C88-45AA-A849-57E5A7AC22C1}"/>
-              </a:ext>
-            </a:extLst>
-          </p:cNvPr>
-          <p:cNvSpPr>
-            <a:spLocks noGrp="1"/>
-          </p:cNvSpPr>
-          <p:nvPr>
-            <p:ph type="sldNum" sz="quarter" idx="10"/>
-          </p:nvPr>
-        </p:nvSpPr>
-        <p:spPr>
-          <a:xfrm>
-            <a:off x="11353800" y="6361475"/>
-            <a:ext cx="838200" cy="360000"/>
-          </a:xfrm>
-        </p:spPr>
-        <p:txBody>
-          <a:bodyPr/>
-          <a:lstStyle/>
-          <a:p>
-            <a:r>
-              <a:rPr lang="en-US" dirty="0"/>
-              <a:t>PAGE </a:t>
-            </a:r>
-            <a:fld id="{4A9B5881-4007-4345-955A-79C2656F0C49}" type="slidenum">
-              <a:rPr lang="en-US" smtClean="0"/>
-              <a:pPr/>
-              <a:t>14</a:t>
-            </a:fld>
-            <a:endParaRPr lang="en-US" dirty="0"/>
-          </a:p>
-        </p:txBody>
-      </p:sp>
-      <p:sp>
-        <p:nvSpPr>
-          <p:cNvPr id="11" name="Rectangle 10">
-            <a:extLst>
-              <a:ext uri="{FF2B5EF4-FFF2-40B4-BE49-F238E27FC236}">
-                <a16:creationId xmlns:a16="http://schemas.microsoft.com/office/drawing/2014/main" id="{5F253864-26FA-4AB1-9F0A-4F57D870EE85}"/>
-              </a:ext>
-              <a:ext uri="{C183D7F6-B498-43B3-948B-1728B52AA6E4}">
-                <adec:decorative xmlns:adec="http://schemas.microsoft.com/office/drawing/2017/decorative" xmlns="" val="1"/>
-              </a:ext>
-            </a:extLst>
-          </p:cNvPr>
-          <p:cNvSpPr/>
-          <p:nvPr/>
-        </p:nvSpPr>
-        <p:spPr>
-          <a:xfrm>
-            <a:off x="6249555" y="6562004"/>
-            <a:ext cx="2552123" cy="159471"/>
-          </a:xfrm>
-          <a:prstGeom prst="rect">
-            <a:avLst/>
-          </a:prstGeom>
-          <a:solidFill>
-            <a:schemeClr val="tx1">
-              <a:lumMod val="85000"/>
-              <a:lumOff val="15000"/>
-            </a:schemeClr>
-          </a:solidFill>
-          <a:ln>
-            <a:noFill/>
-          </a:ln>
-        </p:spPr>
-        <p:style>
-          <a:lnRef idx="2">
-            <a:schemeClr val="accent1">
-              <a:shade val="50000"/>
-            </a:schemeClr>
-          </a:lnRef>
-          <a:fillRef idx="1">
-            <a:schemeClr val="accent1"/>
-          </a:fillRef>
-          <a:effectRef idx="0">
-            <a:schemeClr val="accent1"/>
-          </a:effectRef>
-          <a:fontRef idx="minor">
-            <a:schemeClr val="lt1"/>
-          </a:fontRef>
-        </p:style>
-        <p:txBody>
-          <a:bodyPr anchor="ctr"/>
-          <a:lstStyle/>
-          <a:p>
-            <a:pPr algn="ctr"/>
-            <a:endParaRPr lang="en-US" sz="1200" dirty="0"/>
-          </a:p>
-        </p:txBody>
-      </p:sp>
-      <p:sp>
-        <p:nvSpPr>
-          <p:cNvPr id="5" name="Rectangle 4"/>
-          <p:cNvSpPr/>
-          <p:nvPr/>
-        </p:nvSpPr>
-        <p:spPr>
-          <a:xfrm>
-            <a:off x="5785658" y="3244334"/>
-            <a:ext cx="620683" cy="369332"/>
-          </a:xfrm>
-          <a:prstGeom prst="rect">
-            <a:avLst/>
-          </a:prstGeom>
-        </p:spPr>
-        <p:txBody>
-          <a:bodyPr wrap="none">
-            <a:spAutoFit/>
-          </a:bodyPr>
-          <a:lstStyle/>
-          <a:p>
-            <a:r>
-              <a:rPr lang="en-US" dirty="0"/>
-              <a:t>a b c</a:t>
-            </a:r>
-          </a:p>
-        </p:txBody>
-      </p:sp>
-      <p:sp>
-        <p:nvSpPr>
-          <p:cNvPr id="6" name="Rectangle 5"/>
-          <p:cNvSpPr/>
-          <p:nvPr/>
-        </p:nvSpPr>
-        <p:spPr>
-          <a:xfrm>
-            <a:off x="5785658" y="3244334"/>
-            <a:ext cx="184731" cy="369332"/>
-          </a:xfrm>
-          <a:prstGeom prst="rect">
-            <a:avLst/>
-          </a:prstGeom>
-        </p:spPr>
-        <p:txBody>
-          <a:bodyPr wrap="none">
-            <a:spAutoFit/>
-          </a:bodyPr>
-          <a:lstStyle/>
-          <a:p>
-            <a:endParaRPr lang="en-US" dirty="0"/>
-          </a:p>
-        </p:txBody>
-      </p:sp>
-    </p:spTree>
-    <p:extLst>
-      <p:ext uri="{BB962C8B-B14F-4D97-AF65-F5344CB8AC3E}">
-        <p14:creationId xmlns:p14="http://schemas.microsoft.com/office/powerpoint/2010/main" val="732706058"/>
-      </p:ext>
-    </p:extLst>
-  </p:cSld>
-  <p:clrMapOvr>
-    <a:masterClrMapping/>
-  </p:clrMapOvr>
-  <p:timing>
-    <p:tnLst>
-      <p:par>
-        <p:cTn id="1" dur="indefinite" restart="never" nodeType="tmRoot"/>
-      </p:par>
-    </p:tnLst>
-  </p:timing>
-</p:sld>
-</file>
-
-<file path=ppt/slides/slide15.xml><?xml version="1.0" encoding="utf-8"?>
-<p:sld xmlns:a="http://schemas.openxmlformats.org/drawingml/2006/main" xmlns:r="http://schemas.openxmlformats.org/officeDocument/2006/relationships" xmlns:p="http://schemas.openxmlformats.org/presentationml/2006/main">
-  <p:cSld>
-    <p:spTree>
-      <p:nvGrpSpPr>
-        <p:cNvPr id="1" name=""/>
-        <p:cNvGrpSpPr/>
-        <p:nvPr/>
-      </p:nvGrpSpPr>
-      <p:grpSpPr>
-        <a:xfrm>
-          <a:off x="0" y="0"/>
-          <a:ext cx="0" cy="0"/>
-          <a:chOff x="0" y="0"/>
-          <a:chExt cx="0" cy="0"/>
-        </a:xfrm>
-      </p:grpSpPr>
-      <p:sp>
-        <p:nvSpPr>
-          <p:cNvPr id="2" name="Title 1">
-            <a:extLst>
-              <a:ext uri="{FF2B5EF4-FFF2-40B4-BE49-F238E27FC236}">
                 <a16:creationId xmlns:a16="http://schemas.microsoft.com/office/drawing/2014/main" id="{C8F58AE6-56F6-44E8-8BBF-23277B1773E4}"/>
               </a:ext>
             </a:extLst>
@@ -6172,7 +5243,7 @@
             <a:fld id="{4A9B5881-4007-4345-955A-79C2656F0C49}" type="slidenum">
               <a:rPr lang="en-US" smtClean="0"/>
               <a:pPr/>
-              <a:t>15</a:t>
+              <a:t>12</a:t>
             </a:fld>
             <a:endParaRPr lang="en-US" dirty="0"/>
           </a:p>
@@ -6186,7 +5257,7 @@
                 <a16:creationId xmlns:a16="http://schemas.microsoft.com/office/drawing/2014/main" id="{792980D7-ED01-4955-83DB-59BA18C94FBA}"/>
               </a:ext>
               <a:ext uri="{C183D7F6-B498-43B3-948B-1728B52AA6E4}">
-                <adec:decorative xmlns:adec="http://schemas.microsoft.com/office/drawing/2017/decorative" xmlns="" val="1"/>
+                <adec:decorative xmlns="" xmlns:adec="http://schemas.microsoft.com/office/drawing/2017/decorative" val="1"/>
               </a:ext>
             </a:extLst>
           </p:cNvPr>
@@ -6362,70 +5433,59 @@
           </a:p>
           <a:p>
             <a:r>
-              <a:rPr lang="en-US" sz="2400" b="1" dirty="0" smtClean="0"/>
-              <a:t>Using </a:t>
-            </a:r>
-            <a:r>
-              <a:rPr lang="en-US" sz="2400" b="1" dirty="0"/>
-              <a:t>Operators and Decision Constructs</a:t>
+              <a:rPr lang="en-US" sz="2800" b="1" dirty="0" smtClean="0"/>
+              <a:t>Describing and Using Objects and Classes</a:t>
             </a:r>
           </a:p>
           <a:p>
             <a:pPr lvl="1"/>
-            <a:endParaRPr lang="en-US" sz="2400" dirty="0" smtClean="0"/>
+            <a:r>
+              <a:rPr lang="en-US" dirty="0" smtClean="0"/>
+              <a:t>Declare and instantiate Java objects</a:t>
+            </a:r>
           </a:p>
           <a:p>
             <a:pPr lvl="1"/>
             <a:r>
-              <a:rPr lang="en-US" sz="2400" dirty="0"/>
-              <a:t>Declare </a:t>
-            </a:r>
-            <a:r>
-              <a:rPr lang="en-US" sz="2400" dirty="0"/>
-              <a:t>and initialize variables (including </a:t>
-            </a:r>
-            <a:r>
-              <a:rPr lang="en-US" sz="2400" dirty="0"/>
-              <a:t>casting and </a:t>
-            </a:r>
-            <a:r>
-              <a:rPr lang="en-US" sz="2400" dirty="0"/>
-              <a:t>promoting primitive data </a:t>
-            </a:r>
-            <a:r>
-              <a:rPr lang="en-US" sz="2400" dirty="0"/>
-              <a:t>types</a:t>
+              <a:rPr lang="en-US" dirty="0" smtClean="0"/>
+              <a:t>Define the structure of a Java class</a:t>
             </a:r>
           </a:p>
           <a:p>
             <a:pPr lvl="1"/>
             <a:r>
-              <a:rPr lang="en-US" sz="2400" dirty="0"/>
-              <a:t>Identify </a:t>
-            </a:r>
-            <a:r>
-              <a:rPr lang="en-US" sz="2400" dirty="0"/>
-              <a:t>the scope of </a:t>
-            </a:r>
-            <a:r>
-              <a:rPr lang="en-US" sz="2400" dirty="0"/>
-              <a:t>variable.</a:t>
+              <a:rPr lang="en-US" dirty="0" smtClean="0"/>
+              <a:t>Read or write to object fields</a:t>
             </a:r>
           </a:p>
           <a:p>
             <a:pPr lvl="1"/>
             <a:r>
-              <a:rPr lang="en-US" sz="2400" dirty="0"/>
-              <a:t>Use local variable type </a:t>
-            </a:r>
-            <a:r>
-              <a:rPr lang="en-US" sz="2400" dirty="0"/>
-              <a:t>inference</a:t>
+              <a:rPr lang="en-US" dirty="0" smtClean="0"/>
+              <a:t>Identify the scope of variables</a:t>
             </a:r>
           </a:p>
           <a:p>
             <a:pPr lvl="1"/>
-            <a:endParaRPr lang="en-US" sz="2000" noProof="1"/>
+            <a:r>
+              <a:rPr lang="en-US" dirty="0" smtClean="0"/>
+              <a:t>Use local variable type inference</a:t>
+            </a:r>
+          </a:p>
+          <a:p>
+            <a:pPr lvl="1"/>
+            <a:r>
+              <a:rPr lang="en-US" dirty="0" smtClean="0"/>
+              <a:t>Explain objects' lifecycles (including creation, dereferencing by</a:t>
+            </a:r>
+          </a:p>
+          <a:p>
+            <a:pPr lvl="1"/>
+            <a:r>
+              <a:rPr lang="en-US" dirty="0" smtClean="0"/>
+              <a:t>reassignment, and garbage collection)</a:t>
+            </a:r>
+            <a:endParaRPr lang="en-US" sz="3000" noProof="1"/>
           </a:p>
         </p:txBody>
       </p:sp>
@@ -6476,7 +5536,7 @@
                 <a16:creationId xmlns:a16="http://schemas.microsoft.com/office/drawing/2014/main" id="{5F253864-26FA-4AB1-9F0A-4F57D870EE85}"/>
               </a:ext>
               <a:ext uri="{C183D7F6-B498-43B3-948B-1728B52AA6E4}">
-                <adec:decorative xmlns:adec="http://schemas.microsoft.com/office/drawing/2017/decorative" xmlns="" val="1"/>
+                <adec:decorative xmlns="" xmlns:adec="http://schemas.microsoft.com/office/drawing/2017/decorative" val="1"/>
               </a:ext>
             </a:extLst>
           </p:cNvPr>
@@ -6621,11 +5681,7 @@
           <a:p>
             <a:r>
               <a:rPr lang="en-US" dirty="0" smtClean="0"/>
-              <a:t>                             </a:t>
-            </a:r>
-            <a:r>
-              <a:rPr lang="en-US" dirty="0" smtClean="0"/>
-              <a:t>Data &amp; Types</a:t>
+              <a:t>                       Classes : An Introduction</a:t>
             </a:r>
             <a:endParaRPr lang="en-US" dirty="0"/>
           </a:p>
@@ -6644,7 +5700,7 @@
         <p:spPr/>
         <p:txBody>
           <a:bodyPr>
-            <a:normAutofit fontScale="92500" lnSpcReduction="10000"/>
+            <a:normAutofit/>
           </a:bodyPr>
           <a:lstStyle/>
           <a:p>
@@ -6653,84 +5709,54 @@
           <a:p>
             <a:r>
               <a:rPr lang="en-US" sz="2400" dirty="0" smtClean="0"/>
-              <a:t>A program is nothing but an exercise in manipulating the data represented by variables and objects.</a:t>
+              <a:t>A class as the name suggests is a category of objects having unique and distinguishable characteristics.</a:t>
             </a:r>
           </a:p>
           <a:p>
             <a:r>
               <a:rPr lang="en-US" sz="2400" dirty="0" smtClean="0"/>
-              <a:t>In order to work with data, every language defines certain basic data types.</a:t>
+              <a:t>Ex. class of red roses ,class of cars with power steering etc.</a:t>
             </a:r>
           </a:p>
           <a:p>
             <a:r>
               <a:rPr lang="en-US" sz="2400" dirty="0" smtClean="0"/>
-              <a:t>Java defines primitive data types :</a:t>
-            </a:r>
-          </a:p>
-          <a:p>
-            <a:pPr lvl="1"/>
-            <a:r>
-              <a:rPr lang="en-US" sz="2400" dirty="0" smtClean="0"/>
-              <a:t>byte</a:t>
-            </a:r>
-          </a:p>
-          <a:p>
-            <a:pPr lvl="1"/>
-            <a:r>
-              <a:rPr lang="en-US" sz="2400" dirty="0" smtClean="0"/>
-              <a:t>short </a:t>
-            </a:r>
-          </a:p>
-          <a:p>
-            <a:pPr lvl="1"/>
-            <a:r>
-              <a:rPr lang="en-US" sz="2400" dirty="0" smtClean="0"/>
-              <a:t>char</a:t>
-            </a:r>
-          </a:p>
-          <a:p>
-            <a:pPr lvl="1"/>
-            <a:r>
-              <a:rPr lang="en-US" sz="2400" dirty="0" err="1" smtClean="0"/>
-              <a:t>int</a:t>
-            </a:r>
-            <a:endParaRPr lang="en-US" sz="2400" dirty="0" smtClean="0"/>
-          </a:p>
-          <a:p>
-            <a:pPr lvl="1"/>
-            <a:r>
-              <a:rPr lang="en-US" sz="2400" dirty="0" smtClean="0"/>
-              <a:t>float</a:t>
-            </a:r>
-            <a:endParaRPr lang="en-US" sz="2400" dirty="0" smtClean="0"/>
-          </a:p>
-          <a:p>
-            <a:pPr lvl="1"/>
-            <a:r>
-              <a:rPr lang="en-US" sz="2400" dirty="0" smtClean="0"/>
-              <a:t>double</a:t>
-            </a:r>
-          </a:p>
-          <a:p>
-            <a:pPr lvl="1"/>
-            <a:r>
-              <a:rPr lang="en-US" sz="2400" dirty="0" err="1" smtClean="0"/>
-              <a:t>boolean</a:t>
-            </a:r>
-            <a:endParaRPr lang="en-US" sz="2400" dirty="0" smtClean="0"/>
-          </a:p>
-          <a:p>
-            <a:pPr lvl="1"/>
-            <a:endParaRPr lang="en-US" sz="2200" dirty="0" smtClean="0"/>
-          </a:p>
-          <a:p>
-            <a:pPr lvl="1"/>
-            <a:endParaRPr lang="en-US" sz="2200" dirty="0" smtClean="0"/>
-          </a:p>
-          <a:p>
-            <a:pPr lvl="1"/>
-            <a:endParaRPr lang="en-US" sz="2200" dirty="0" smtClean="0"/>
+              <a:t>In java we use a class to model a real world entity.</a:t>
+            </a:r>
+          </a:p>
+          <a:p>
+            <a:r>
+              <a:rPr lang="en-US" sz="2200" dirty="0" smtClean="0"/>
+              <a:t>Once a class is created we can then create objects of it. This is similar to having a class of Mercedes Benz cars and actually buying a </a:t>
+            </a:r>
+            <a:r>
+              <a:rPr lang="en-US" sz="2200" dirty="0" err="1" smtClean="0"/>
+              <a:t>mercedez</a:t>
+            </a:r>
+            <a:r>
+              <a:rPr lang="en-US" sz="2200" dirty="0" smtClean="0"/>
+              <a:t> </a:t>
+            </a:r>
+            <a:r>
+              <a:rPr lang="en-US" sz="2200" dirty="0" err="1" smtClean="0"/>
+              <a:t>benz</a:t>
+            </a:r>
+            <a:r>
+              <a:rPr lang="en-US" sz="2200" dirty="0" smtClean="0"/>
+              <a:t> of that class.</a:t>
+            </a:r>
+          </a:p>
+          <a:p>
+            <a:r>
+              <a:rPr lang="en-US" sz="2200" dirty="0" smtClean="0"/>
+              <a:t>Classes in java have member variables and methods.</a:t>
+            </a:r>
+          </a:p>
+          <a:p>
+            <a:r>
+              <a:rPr lang="en-US" sz="2200" dirty="0" smtClean="0"/>
+              <a:t>For example we could create an Employee class and save it using .java extension.</a:t>
+            </a:r>
           </a:p>
           <a:p>
             <a:endParaRPr lang="en-US" sz="2400" dirty="0" smtClean="0"/>
@@ -6779,7 +5805,7 @@
                 <a16:creationId xmlns:a16="http://schemas.microsoft.com/office/drawing/2014/main" id="{5F253864-26FA-4AB1-9F0A-4F57D870EE85}"/>
               </a:ext>
               <a:ext uri="{C183D7F6-B498-43B3-948B-1728B52AA6E4}">
-                <adec:decorative xmlns:adec="http://schemas.microsoft.com/office/drawing/2017/decorative" xmlns="" val="1"/>
+                <adec:decorative xmlns="" xmlns:adec="http://schemas.microsoft.com/office/drawing/2017/decorative" val="1"/>
               </a:ext>
             </a:extLst>
           </p:cNvPr>
@@ -6884,8 +5910,8 @@
         </p:nvSpPr>
         <p:spPr>
           <a:xfrm>
-            <a:off x="838199" y="611079"/>
-            <a:ext cx="10515600" cy="833663"/>
+            <a:off x="838200" y="641855"/>
+            <a:ext cx="10515600" cy="772107"/>
           </a:xfrm>
         </p:spPr>
         <p:txBody>
@@ -6894,7 +5920,7 @@
           <a:p>
             <a:r>
               <a:rPr lang="en-US" dirty="0" smtClean="0"/>
-              <a:t>                                      Package</a:t>
+              <a:t>                       Structure of a class.</a:t>
             </a:r>
             <a:endParaRPr lang="en-US" dirty="0"/>
           </a:p>
@@ -6902,13 +5928,7 @@
       </p:sp>
       <p:sp>
         <p:nvSpPr>
-          <p:cNvPr id="3" name="Content Placeholder 2">
-            <a:extLst>
-              <a:ext uri="{FF2B5EF4-FFF2-40B4-BE49-F238E27FC236}">
-                <a16:creationId xmlns:a16="http://schemas.microsoft.com/office/drawing/2014/main" id="{FA6A4B49-27C8-46B6-8B11-AD7E8F615E2C}"/>
-              </a:ext>
-            </a:extLst>
-          </p:cNvPr>
+          <p:cNvPr id="6" name="Content Placeholder 5"/>
           <p:cNvSpPr>
             <a:spLocks noGrp="1"/>
           </p:cNvSpPr>
@@ -6919,14 +5939,93 @@
         <p:spPr/>
         <p:txBody>
           <a:bodyPr>
-            <a:normAutofit/>
+            <a:normAutofit lnSpcReduction="10000"/>
           </a:bodyPr>
           <a:lstStyle/>
           <a:p>
-            <a:endParaRPr lang="en-US" dirty="0" smtClean="0"/>
-          </a:p>
-          <a:p>
-            <a:endParaRPr lang="en-US" dirty="0"/>
+            <a:r>
+              <a:rPr lang="en-US" sz="3200" dirty="0" smtClean="0"/>
+              <a:t>Within a class you can have the following :</a:t>
+            </a:r>
+          </a:p>
+          <a:p>
+            <a:pPr lvl="1"/>
+            <a:r>
+              <a:rPr lang="en-US" sz="2800" dirty="0" smtClean="0"/>
+              <a:t>Instance and static members of different data types</a:t>
+            </a:r>
+          </a:p>
+          <a:p>
+            <a:pPr lvl="1"/>
+            <a:r>
+              <a:rPr lang="en-US" sz="2800" dirty="0" smtClean="0"/>
+              <a:t>Instance and static methods</a:t>
+            </a:r>
+          </a:p>
+          <a:p>
+            <a:pPr lvl="1"/>
+            <a:r>
+              <a:rPr lang="en-US" sz="2800" dirty="0" smtClean="0"/>
+              <a:t>Constructors</a:t>
+            </a:r>
+            <a:endParaRPr lang="en-US" sz="2800" dirty="0"/>
+          </a:p>
+          <a:p>
+            <a:pPr lvl="1"/>
+            <a:r>
+              <a:rPr lang="en-US" sz="2800" dirty="0" smtClean="0"/>
+              <a:t>Object initializers &amp; static initializers</a:t>
+            </a:r>
+          </a:p>
+          <a:p>
+            <a:pPr lvl="1"/>
+            <a:r>
+              <a:rPr lang="en-US" sz="2800" dirty="0" smtClean="0"/>
+              <a:t>Another class.</a:t>
+            </a:r>
+          </a:p>
+          <a:p>
+            <a:r>
+              <a:rPr lang="en-US" sz="2400" dirty="0" smtClean="0"/>
+              <a:t>An actual instance of the class is called it’s object. Objects are created using the new operator as follows :</a:t>
+            </a:r>
+          </a:p>
+          <a:p>
+            <a:pPr lvl="1"/>
+            <a:r>
+              <a:rPr lang="en-US" sz="2200" dirty="0" smtClean="0"/>
+              <a:t>Employee </a:t>
+            </a:r>
+            <a:r>
+              <a:rPr lang="en-US" sz="2200" dirty="0" err="1" smtClean="0"/>
+              <a:t>employee</a:t>
+            </a:r>
+            <a:r>
+              <a:rPr lang="en-US" sz="2200" dirty="0" smtClean="0"/>
+              <a:t> = new Employee()</a:t>
+            </a:r>
+          </a:p>
+          <a:p>
+            <a:pPr lvl="1"/>
+            <a:r>
+              <a:rPr lang="en-US" sz="2200" dirty="0" smtClean="0"/>
+              <a:t>This statement creates an object of employee class an assigns it to the employee reference.</a:t>
+            </a:r>
+          </a:p>
+          <a:p>
+            <a:endParaRPr lang="en-US" sz="2400" dirty="0" smtClean="0"/>
+          </a:p>
+          <a:p>
+            <a:endParaRPr lang="en-US" sz="2400" dirty="0" smtClean="0"/>
+          </a:p>
+          <a:p>
+            <a:endParaRPr lang="en-US" sz="2400" dirty="0" smtClean="0"/>
+          </a:p>
+          <a:p>
+            <a:endParaRPr lang="en-US" sz="2400" dirty="0" smtClean="0"/>
+          </a:p>
+          <a:p>
+            <a:endParaRPr lang="en-US" sz="2400" dirty="0" smtClean="0"/>
           </a:p>
         </p:txBody>
       </p:sp>
@@ -6946,12 +6045,7 @@
             <p:ph type="sldNum" sz="quarter" idx="10"/>
           </p:nvPr>
         </p:nvSpPr>
-        <p:spPr>
-          <a:xfrm>
-            <a:off x="11353800" y="6361475"/>
-            <a:ext cx="838200" cy="360000"/>
-          </a:xfrm>
-        </p:spPr>
+        <p:spPr/>
         <p:txBody>
           <a:bodyPr/>
           <a:lstStyle/>
@@ -6977,7 +6071,7 @@
                 <a16:creationId xmlns:a16="http://schemas.microsoft.com/office/drawing/2014/main" id="{5F253864-26FA-4AB1-9F0A-4F57D870EE85}"/>
               </a:ext>
               <a:ext uri="{C183D7F6-B498-43B3-948B-1728B52AA6E4}">
-                <adec:decorative xmlns:adec="http://schemas.microsoft.com/office/drawing/2017/decorative" xmlns="" val="1"/>
+                <adec:decorative xmlns="" xmlns:adec="http://schemas.microsoft.com/office/drawing/2017/decorative" val="1"/>
               </a:ext>
             </a:extLst>
           </p:cNvPr>
@@ -7027,40 +6121,10 @@
           </a:p>
         </p:txBody>
       </p:sp>
-      <p:pic>
-        <p:nvPicPr>
-          <p:cNvPr id="6" name="Picture 5"/>
-          <p:cNvPicPr>
-            <a:picLocks noChangeAspect="1"/>
-          </p:cNvPicPr>
-          <p:nvPr/>
-        </p:nvPicPr>
-        <p:blipFill>
-          <a:blip r:embed="rId2">
-            <a:extLst>
-              <a:ext uri="{28A0092B-C50C-407E-A947-70E740481C1C}">
-                <a14:useLocalDpi xmlns:a14="http://schemas.microsoft.com/office/drawing/2010/main" val="0"/>
-              </a:ext>
-            </a:extLst>
-          </a:blip>
-          <a:stretch>
-            <a:fillRect/>
-          </a:stretch>
-        </p:blipFill>
-        <p:spPr>
-          <a:xfrm>
-            <a:off x="1865745" y="1745673"/>
-            <a:ext cx="7786255" cy="4525818"/>
-          </a:xfrm>
-          <a:prstGeom prst="rect">
-            <a:avLst/>
-          </a:prstGeom>
-        </p:spPr>
-      </p:pic>
     </p:spTree>
     <p:extLst>
       <p:ext uri="{BB962C8B-B14F-4D97-AF65-F5344CB8AC3E}">
-        <p14:creationId xmlns:p14="http://schemas.microsoft.com/office/powerpoint/2010/main" val="1894288286"/>
+        <p14:creationId xmlns:p14="http://schemas.microsoft.com/office/powerpoint/2010/main" val="1135271833"/>
       </p:ext>
     </p:extLst>
   </p:cSld>
@@ -7112,17 +6176,18 @@
         </p:nvSpPr>
         <p:spPr>
           <a:xfrm>
-            <a:off x="838199" y="611081"/>
-            <a:ext cx="10337801" cy="833663"/>
+            <a:off x="838200" y="641855"/>
+            <a:ext cx="10515600" cy="772107"/>
           </a:xfrm>
         </p:spPr>
         <p:txBody>
           <a:bodyPr/>
           <a:lstStyle/>
           <a:p>
+            <a:pPr algn="ctr"/>
             <a:r>
               <a:rPr lang="en-US" dirty="0" smtClean="0"/>
-              <a:t>                          Integral Data Types</a:t>
+              <a:t>References</a:t>
             </a:r>
             <a:endParaRPr lang="en-US" dirty="0"/>
           </a:p>
@@ -7130,13 +6195,7 @@
       </p:sp>
       <p:sp>
         <p:nvSpPr>
-          <p:cNvPr id="3" name="Content Placeholder 2">
-            <a:extLst>
-              <a:ext uri="{FF2B5EF4-FFF2-40B4-BE49-F238E27FC236}">
-                <a16:creationId xmlns:a16="http://schemas.microsoft.com/office/drawing/2014/main" id="{FA6A4B49-27C8-46B6-8B11-AD7E8F615E2C}"/>
-              </a:ext>
-            </a:extLst>
-          </p:cNvPr>
+          <p:cNvPr id="6" name="Content Placeholder 5"/>
           <p:cNvSpPr>
             <a:spLocks noGrp="1"/>
           </p:cNvSpPr>
@@ -7147,86 +6206,67 @@
         <p:spPr/>
         <p:txBody>
           <a:bodyPr>
-            <a:normAutofit fontScale="92500" lnSpcReduction="10000"/>
+            <a:normAutofit fontScale="92500" lnSpcReduction="20000"/>
           </a:bodyPr>
           <a:lstStyle/>
           <a:p>
             <a:r>
-              <a:rPr lang="en-US" sz="2800" dirty="0"/>
-              <a:t>Integral values are represented as signed two’s </a:t>
-            </a:r>
-            <a:r>
-              <a:rPr lang="en-US" sz="2800" dirty="0" smtClean="0"/>
-              <a:t>compliment except for character values. </a:t>
-            </a:r>
-          </a:p>
-          <a:p>
-            <a:r>
-              <a:rPr lang="en-US" sz="2800" dirty="0"/>
-              <a:t>Good to know but </a:t>
-            </a:r>
-            <a:r>
-              <a:rPr lang="en-US" sz="2800" dirty="0"/>
-              <a:t> </a:t>
-            </a:r>
-            <a:r>
-              <a:rPr lang="en-US" sz="2800" dirty="0"/>
-              <a:t>not </a:t>
-            </a:r>
-            <a:r>
-              <a:rPr lang="en-US" sz="2800" dirty="0"/>
-              <a:t>required for exam.</a:t>
-            </a:r>
-            <a:endParaRPr lang="en-US" sz="2800" dirty="0"/>
-          </a:p>
-          <a:p>
-            <a:endParaRPr lang="en-US" sz="2800" dirty="0"/>
-          </a:p>
-          <a:p>
-            <a:r>
-              <a:rPr lang="en-US" sz="2800" dirty="0" smtClean="0"/>
-              <a:t>byte</a:t>
-            </a:r>
-            <a:endParaRPr lang="en-US" sz="2800" dirty="0" smtClean="0"/>
-          </a:p>
-          <a:p>
-            <a:r>
-              <a:rPr lang="en-US" sz="2800" dirty="0" smtClean="0"/>
-              <a:t>short</a:t>
-            </a:r>
-          </a:p>
-          <a:p>
-            <a:r>
-              <a:rPr lang="en-US" sz="2800" dirty="0" smtClean="0"/>
-              <a:t>char (unsigned)</a:t>
-            </a:r>
-            <a:endParaRPr lang="en-US" sz="2800" dirty="0" smtClean="0"/>
-          </a:p>
-          <a:p>
-            <a:r>
-              <a:rPr lang="en-US" sz="2800" dirty="0" err="1" smtClean="0"/>
+              <a:rPr lang="en-US" sz="3200" dirty="0" smtClean="0"/>
+              <a:t>An instance of a class is called an object. Objects are created using new operator.</a:t>
+            </a:r>
+          </a:p>
+          <a:p>
+            <a:r>
+              <a:rPr lang="en-US" sz="3200" dirty="0" smtClean="0"/>
+              <a:t>A reference variable is like a pointer to an object of reference type.</a:t>
+            </a:r>
+          </a:p>
+          <a:p>
+            <a:r>
+              <a:rPr lang="en-US" sz="3200" dirty="0" smtClean="0"/>
+              <a:t>All operations on the object happens through the reference variable.</a:t>
+            </a:r>
+          </a:p>
+          <a:p>
+            <a:r>
+              <a:rPr lang="en-US" sz="3200" dirty="0" smtClean="0"/>
+              <a:t>A reference variable is similar to </a:t>
+            </a:r>
+            <a:r>
+              <a:rPr lang="en-US" sz="3200" dirty="0" err="1" smtClean="0"/>
               <a:t>int</a:t>
             </a:r>
-            <a:endParaRPr lang="en-US" sz="2800" dirty="0" smtClean="0"/>
-          </a:p>
-          <a:p>
-            <a:r>
-              <a:rPr lang="en-US" sz="2800" dirty="0" smtClean="0"/>
-              <a:t>long</a:t>
-            </a:r>
-            <a:endParaRPr lang="en-US" sz="2800" dirty="0"/>
-          </a:p>
-          <a:p>
-            <a:endParaRPr lang="en-US" dirty="0" smtClean="0"/>
-          </a:p>
-          <a:p>
-            <a:endParaRPr lang="en-US" dirty="0" smtClean="0"/>
-          </a:p>
-          <a:p>
-            <a:endParaRPr lang="en-US" dirty="0" smtClean="0"/>
-          </a:p>
-          <a:p>
-            <a:endParaRPr lang="en-US" noProof="1"/>
+            <a:r>
+              <a:rPr lang="en-US" sz="3200" dirty="0" smtClean="0"/>
+              <a:t> variable as </a:t>
+            </a:r>
+            <a:r>
+              <a:rPr lang="en-US" sz="3200" dirty="0" err="1" smtClean="0"/>
+              <a:t>int</a:t>
+            </a:r>
+            <a:r>
+              <a:rPr lang="en-US" sz="3200" dirty="0" smtClean="0"/>
+              <a:t> variable stores a number and reference variable also stores a number but that number denotes the memory location of the object.</a:t>
+            </a:r>
+          </a:p>
+          <a:p>
+            <a:r>
+              <a:rPr lang="en-US" sz="3200" dirty="0" smtClean="0"/>
+              <a:t>Assigning ‘null’ to a reference variable in java means that , that reference variable does not point to any object.</a:t>
+            </a:r>
+            <a:endParaRPr lang="en-US" sz="2400" dirty="0" smtClean="0"/>
+          </a:p>
+          <a:p>
+            <a:endParaRPr lang="en-US" sz="2400" dirty="0" smtClean="0"/>
+          </a:p>
+          <a:p>
+            <a:endParaRPr lang="en-US" sz="2400" dirty="0" smtClean="0"/>
+          </a:p>
+          <a:p>
+            <a:endParaRPr lang="en-US" sz="2400" dirty="0" smtClean="0"/>
+          </a:p>
+          <a:p>
+            <a:endParaRPr lang="en-US" sz="2400" dirty="0" smtClean="0"/>
           </a:p>
         </p:txBody>
       </p:sp>
@@ -7246,12 +6286,7 @@
             <p:ph type="sldNum" sz="quarter" idx="10"/>
           </p:nvPr>
         </p:nvSpPr>
-        <p:spPr>
-          <a:xfrm>
-            <a:off x="11353800" y="6361475"/>
-            <a:ext cx="838200" cy="360000"/>
-          </a:xfrm>
-        </p:spPr>
+        <p:spPr/>
         <p:txBody>
           <a:bodyPr/>
           <a:lstStyle/>
@@ -7277,7 +6312,7 @@
                 <a16:creationId xmlns:a16="http://schemas.microsoft.com/office/drawing/2014/main" id="{5F253864-26FA-4AB1-9F0A-4F57D870EE85}"/>
               </a:ext>
               <a:ext uri="{C183D7F6-B498-43B3-948B-1728B52AA6E4}">
-                <adec:decorative xmlns:adec="http://schemas.microsoft.com/office/drawing/2017/decorative" xmlns="" val="1"/>
+                <adec:decorative xmlns="" xmlns:adec="http://schemas.microsoft.com/office/drawing/2017/decorative" val="1"/>
               </a:ext>
             </a:extLst>
           </p:cNvPr>
@@ -7327,40 +6362,10 @@
           </a:p>
         </p:txBody>
       </p:sp>
-      <p:pic>
-        <p:nvPicPr>
-          <p:cNvPr id="9" name="Picture 8"/>
-          <p:cNvPicPr>
-            <a:picLocks noChangeAspect="1"/>
-          </p:cNvPicPr>
-          <p:nvPr/>
-        </p:nvPicPr>
-        <p:blipFill>
-          <a:blip r:embed="rId2">
-            <a:extLst>
-              <a:ext uri="{28A0092B-C50C-407E-A947-70E740481C1C}">
-                <a14:useLocalDpi xmlns:a14="http://schemas.microsoft.com/office/drawing/2010/main" val="0"/>
-              </a:ext>
-            </a:extLst>
-          </a:blip>
-          <a:stretch>
-            <a:fillRect/>
-          </a:stretch>
-        </p:blipFill>
-        <p:spPr>
-          <a:xfrm>
-            <a:off x="6834908" y="1858530"/>
-            <a:ext cx="4341091" cy="4318433"/>
-          </a:xfrm>
-          <a:prstGeom prst="rect">
-            <a:avLst/>
-          </a:prstGeom>
-        </p:spPr>
-      </p:pic>
     </p:spTree>
     <p:extLst>
       <p:ext uri="{BB962C8B-B14F-4D97-AF65-F5344CB8AC3E}">
-        <p14:creationId xmlns:p14="http://schemas.microsoft.com/office/powerpoint/2010/main" val="1533683092"/>
+        <p14:creationId xmlns:p14="http://schemas.microsoft.com/office/powerpoint/2010/main" val="2516534599"/>
       </p:ext>
     </p:extLst>
   </p:cSld>
@@ -7412,17 +6417,18 @@
         </p:nvSpPr>
         <p:spPr>
           <a:xfrm>
-            <a:off x="838199" y="611081"/>
-            <a:ext cx="10337801" cy="833663"/>
+            <a:off x="838200" y="641855"/>
+            <a:ext cx="10515600" cy="772107"/>
           </a:xfrm>
         </p:spPr>
         <p:txBody>
           <a:bodyPr/>
           <a:lstStyle/>
           <a:p>
+            <a:pPr algn="ctr"/>
             <a:r>
               <a:rPr lang="en-US" dirty="0" smtClean="0"/>
-              <a:t>                          Char : A special case.</a:t>
+              <a:t>Static members of Class</a:t>
             </a:r>
             <a:endParaRPr lang="en-US" dirty="0"/>
           </a:p>
@@ -7430,13 +6436,7 @@
       </p:sp>
       <p:sp>
         <p:nvSpPr>
-          <p:cNvPr id="3" name="Content Placeholder 2">
-            <a:extLst>
-              <a:ext uri="{FF2B5EF4-FFF2-40B4-BE49-F238E27FC236}">
-                <a16:creationId xmlns:a16="http://schemas.microsoft.com/office/drawing/2014/main" id="{FA6A4B49-27C8-46B6-8B11-AD7E8F615E2C}"/>
-              </a:ext>
-            </a:extLst>
-          </p:cNvPr>
+          <p:cNvPr id="6" name="Content Placeholder 5"/>
           <p:cNvSpPr>
             <a:spLocks noGrp="1"/>
           </p:cNvSpPr>
@@ -7451,16 +6451,34 @@
           </a:bodyPr>
           <a:lstStyle/>
           <a:p>
-            <a:endParaRPr lang="en-US" dirty="0" smtClean="0"/>
-          </a:p>
-          <a:p>
-            <a:endParaRPr lang="en-US" dirty="0" smtClean="0"/>
-          </a:p>
-          <a:p>
-            <a:endParaRPr lang="en-US" dirty="0" smtClean="0"/>
-          </a:p>
-          <a:p>
-            <a:endParaRPr lang="en-US" noProof="1"/>
+            <a:r>
+              <a:rPr lang="en-US" sz="3200" dirty="0" smtClean="0"/>
+              <a:t>Static members of a class are those that belong to the class. Non-static members of the class belong to the instantiated objects of that class. All objects have their own copy of the non-static members of the class.</a:t>
+            </a:r>
+          </a:p>
+          <a:p>
+            <a:r>
+              <a:rPr lang="en-US" sz="3200" dirty="0" smtClean="0"/>
+              <a:t>Static members of the class can be accessed as follows :</a:t>
+            </a:r>
+          </a:p>
+          <a:p>
+            <a:pPr lvl="1"/>
+            <a:r>
+              <a:rPr lang="en-US" sz="3000" dirty="0" smtClean="0"/>
+              <a:t>&lt;</a:t>
+            </a:r>
+            <a:r>
+              <a:rPr lang="en-US" sz="3000" dirty="0" err="1" smtClean="0"/>
+              <a:t>Classname</a:t>
+            </a:r>
+            <a:r>
+              <a:rPr lang="en-US" sz="3000" dirty="0" smtClean="0"/>
+              <a:t>&gt;.&lt;static member&gt;</a:t>
+            </a:r>
+          </a:p>
+          <a:p>
+            <a:endParaRPr lang="en-US" sz="3200" dirty="0" smtClean="0"/>
           </a:p>
         </p:txBody>
       </p:sp>
@@ -7480,12 +6498,7 @@
             <p:ph type="sldNum" sz="quarter" idx="10"/>
           </p:nvPr>
         </p:nvSpPr>
-        <p:spPr>
-          <a:xfrm>
-            <a:off x="11353800" y="6361475"/>
-            <a:ext cx="838200" cy="360000"/>
-          </a:xfrm>
-        </p:spPr>
+        <p:spPr/>
         <p:txBody>
           <a:bodyPr/>
           <a:lstStyle/>
@@ -7511,7 +6524,7 @@
                 <a16:creationId xmlns:a16="http://schemas.microsoft.com/office/drawing/2014/main" id="{5F253864-26FA-4AB1-9F0A-4F57D870EE85}"/>
               </a:ext>
               <a:ext uri="{C183D7F6-B498-43B3-948B-1728B52AA6E4}">
-                <adec:decorative xmlns:adec="http://schemas.microsoft.com/office/drawing/2017/decorative" xmlns="" val="1"/>
+                <adec:decorative xmlns="" xmlns:adec="http://schemas.microsoft.com/office/drawing/2017/decorative" val="1"/>
               </a:ext>
             </a:extLst>
           </p:cNvPr>
@@ -7561,40 +6574,10 @@
           </a:p>
         </p:txBody>
       </p:sp>
-      <p:pic>
-        <p:nvPicPr>
-          <p:cNvPr id="9" name="Picture 8"/>
-          <p:cNvPicPr>
-            <a:picLocks noChangeAspect="1"/>
-          </p:cNvPicPr>
-          <p:nvPr/>
-        </p:nvPicPr>
-        <p:blipFill>
-          <a:blip r:embed="rId2">
-            <a:extLst>
-              <a:ext uri="{28A0092B-C50C-407E-A947-70E740481C1C}">
-                <a14:useLocalDpi xmlns:a14="http://schemas.microsoft.com/office/drawing/2010/main" val="0"/>
-              </a:ext>
-            </a:extLst>
-          </a:blip>
-          <a:stretch>
-            <a:fillRect/>
-          </a:stretch>
-        </p:blipFill>
-        <p:spPr>
-          <a:xfrm>
-            <a:off x="6834908" y="1858530"/>
-            <a:ext cx="4341091" cy="4318433"/>
-          </a:xfrm>
-          <a:prstGeom prst="rect">
-            <a:avLst/>
-          </a:prstGeom>
-        </p:spPr>
-      </p:pic>
     </p:spTree>
     <p:extLst>
       <p:ext uri="{BB962C8B-B14F-4D97-AF65-F5344CB8AC3E}">
-        <p14:creationId xmlns:p14="http://schemas.microsoft.com/office/powerpoint/2010/main" val="1158156119"/>
+        <p14:creationId xmlns:p14="http://schemas.microsoft.com/office/powerpoint/2010/main" val="3991649606"/>
       </p:ext>
     </p:extLst>
   </p:cSld>
@@ -7646,17 +6629,18 @@
         </p:nvSpPr>
         <p:spPr>
           <a:xfrm>
-            <a:off x="838199" y="611081"/>
-            <a:ext cx="10337801" cy="833663"/>
+            <a:off x="838199" y="611079"/>
+            <a:ext cx="10515600" cy="833663"/>
           </a:xfrm>
         </p:spPr>
         <p:txBody>
           <a:bodyPr/>
           <a:lstStyle/>
           <a:p>
+            <a:pPr algn="ctr"/>
             <a:r>
               <a:rPr lang="en-US" dirty="0" smtClean="0"/>
-              <a:t>                          Floating Data Types</a:t>
+              <a:t>Stack</a:t>
             </a:r>
             <a:endParaRPr lang="en-US" dirty="0"/>
           </a:p>
@@ -7681,57 +6665,93 @@
         <p:spPr/>
         <p:txBody>
           <a:bodyPr>
-            <a:normAutofit/>
+            <a:normAutofit fontScale="70000" lnSpcReduction="20000"/>
           </a:bodyPr>
           <a:lstStyle/>
           <a:p>
-            <a:endParaRPr lang="en-US" dirty="0"/>
-          </a:p>
-          <a:p>
-            <a:r>
-              <a:rPr lang="en-US" sz="2800" b="1" dirty="0" smtClean="0"/>
-              <a:t>Java follows IEEE-754 standard for representation of floating point numbers.</a:t>
-            </a:r>
-          </a:p>
-          <a:p>
-            <a:r>
-              <a:rPr lang="en-US" sz="2800" b="1" dirty="0"/>
-              <a:t>Good to know but not </a:t>
-            </a:r>
-            <a:r>
-              <a:rPr lang="en-US" sz="2800" b="1" dirty="0" smtClean="0"/>
-              <a:t>required for exam</a:t>
-            </a:r>
-            <a:endParaRPr lang="en-US" sz="2800" b="1" dirty="0"/>
-          </a:p>
-          <a:p>
-            <a:endParaRPr lang="en-US" sz="2800" b="1" dirty="0" smtClean="0"/>
-          </a:p>
-          <a:p>
-            <a:r>
-              <a:rPr lang="en-US" sz="2800" b="1" dirty="0" smtClean="0"/>
-              <a:t>float</a:t>
-            </a:r>
-            <a:endParaRPr lang="en-US" sz="2800" b="1" dirty="0"/>
-          </a:p>
-          <a:p>
-            <a:r>
-              <a:rPr lang="en-US" sz="2800" b="1" dirty="0" smtClean="0"/>
-              <a:t>double</a:t>
-            </a:r>
-            <a:endParaRPr lang="en-US" sz="2800" b="1" dirty="0" smtClean="0"/>
-          </a:p>
-          <a:p>
-            <a:endParaRPr lang="en-US" dirty="0" smtClean="0"/>
-          </a:p>
-          <a:p>
-            <a:endParaRPr lang="en-US" dirty="0" smtClean="0"/>
-          </a:p>
-          <a:p>
-            <a:endParaRPr lang="en-US" dirty="0" smtClean="0"/>
-          </a:p>
-          <a:p>
-            <a:endParaRPr lang="en-US" noProof="1"/>
+            <a:r>
+              <a:rPr lang="en-US" sz="2800" dirty="0" smtClean="0"/>
+              <a:t>All programs in java are executed in a thread. A thread is a basic unit of execution. There is a main thread that starts the execution. Each thread has a dedicated stack memory for program execution.</a:t>
+            </a:r>
+          </a:p>
+          <a:p>
+            <a:r>
+              <a:rPr lang="en-US" sz="2800" dirty="0" smtClean="0"/>
+              <a:t>Stack </a:t>
+            </a:r>
+            <a:r>
+              <a:rPr lang="en-US" sz="2800" dirty="0"/>
+              <a:t>is a data structure which follows Last In First Out (LIFO) order</a:t>
+            </a:r>
+            <a:r>
+              <a:rPr lang="en-US" sz="2800" dirty="0" smtClean="0"/>
+              <a:t>.</a:t>
+            </a:r>
+          </a:p>
+          <a:p>
+            <a:r>
+              <a:rPr lang="en-US" sz="2800" dirty="0"/>
+              <a:t>Add operation on a stack is referred to as push and remove operation is referred to as pop</a:t>
+            </a:r>
+            <a:r>
+              <a:rPr lang="en-US" sz="2800" dirty="0" smtClean="0"/>
+              <a:t>.</a:t>
+            </a:r>
+          </a:p>
+          <a:p>
+            <a:r>
+              <a:rPr lang="en-US" sz="2800" dirty="0" smtClean="0"/>
+              <a:t>Whenever </a:t>
+            </a:r>
+            <a:r>
+              <a:rPr lang="en-US" sz="2800" dirty="0"/>
+              <a:t>we call a method </a:t>
+            </a:r>
+            <a:r>
+              <a:rPr lang="en-US" sz="2800" dirty="0" smtClean="0"/>
+              <a:t>,a </a:t>
+            </a:r>
+            <a:r>
+              <a:rPr lang="en-US" sz="2800" dirty="0"/>
+              <a:t>new block of memory is allocated on top of the current block in the stack </a:t>
+            </a:r>
+            <a:r>
+              <a:rPr lang="en-US" sz="2800" dirty="0" smtClean="0"/>
+              <a:t>memory. We call this as stack frame. </a:t>
+            </a:r>
+            <a:r>
+              <a:rPr lang="en-US" sz="2800" dirty="0"/>
+              <a:t>All variables inside the method are allocated space in </a:t>
+            </a:r>
+            <a:r>
+              <a:rPr lang="en-US" sz="2800" dirty="0" smtClean="0"/>
+              <a:t>that stack frame. </a:t>
+            </a:r>
+            <a:r>
+              <a:rPr lang="en-US" sz="2800" dirty="0"/>
+              <a:t>Once that method call finishes that specific </a:t>
+            </a:r>
+            <a:r>
+              <a:rPr lang="en-US" sz="2800" dirty="0" smtClean="0"/>
+              <a:t>stack frame </a:t>
+            </a:r>
+            <a:r>
+              <a:rPr lang="en-US" sz="2800" dirty="0"/>
+              <a:t>which was allocated for that method call is </a:t>
+            </a:r>
+            <a:r>
+              <a:rPr lang="en-US" sz="2800" dirty="0" smtClean="0"/>
+              <a:t>popped.</a:t>
+            </a:r>
+          </a:p>
+          <a:p>
+            <a:r>
+              <a:rPr lang="en-US" sz="2800" dirty="0" smtClean="0"/>
+              <a:t>Default stack size is 1MB. We can change this value as needed.</a:t>
+            </a:r>
+          </a:p>
+          <a:p>
+            <a:endParaRPr lang="en-US" sz="2800" dirty="0"/>
           </a:p>
         </p:txBody>
       </p:sp>
@@ -7782,7 +6802,7 @@
                 <a16:creationId xmlns:a16="http://schemas.microsoft.com/office/drawing/2014/main" id="{5F253864-26FA-4AB1-9F0A-4F57D870EE85}"/>
               </a:ext>
               <a:ext uri="{C183D7F6-B498-43B3-948B-1728B52AA6E4}">
-                <adec:decorative xmlns:adec="http://schemas.microsoft.com/office/drawing/2017/decorative" xmlns="" val="1"/>
+                <adec:decorative xmlns="" xmlns:adec="http://schemas.microsoft.com/office/drawing/2017/decorative" val="1"/>
               </a:ext>
             </a:extLst>
           </p:cNvPr>
@@ -7834,28 +6854,22 @@
       </p:sp>
       <p:pic>
         <p:nvPicPr>
-          <p:cNvPr id="5" name="Picture 4"/>
+          <p:cNvPr id="8" name="Picture 7"/>
           <p:cNvPicPr>
             <a:picLocks noChangeAspect="1"/>
           </p:cNvPicPr>
           <p:nvPr/>
         </p:nvPicPr>
         <p:blipFill>
-          <a:blip r:embed="rId2">
-            <a:extLst>
-              <a:ext uri="{28A0092B-C50C-407E-A947-70E740481C1C}">
-                <a14:useLocalDpi xmlns:a14="http://schemas.microsoft.com/office/drawing/2010/main" val="0"/>
-              </a:ext>
-            </a:extLst>
-          </a:blip>
+          <a:blip r:embed="rId2"/>
           <a:stretch>
             <a:fillRect/>
           </a:stretch>
         </p:blipFill>
         <p:spPr>
           <a:xfrm>
-            <a:off x="6391564" y="2050473"/>
-            <a:ext cx="4727286" cy="3805382"/>
+            <a:off x="7857636" y="1634981"/>
+            <a:ext cx="3496163" cy="4618038"/>
           </a:xfrm>
           <a:prstGeom prst="rect">
             <a:avLst/>
@@ -7865,7 +6879,7 @@
     </p:spTree>
     <p:extLst>
       <p:ext uri="{BB962C8B-B14F-4D97-AF65-F5344CB8AC3E}">
-        <p14:creationId xmlns:p14="http://schemas.microsoft.com/office/powerpoint/2010/main" val="134744934"/>
+        <p14:creationId xmlns:p14="http://schemas.microsoft.com/office/powerpoint/2010/main" val="2220640955"/>
       </p:ext>
     </p:extLst>
   </p:cSld>
@@ -7917,17 +6931,18 @@
         </p:nvSpPr>
         <p:spPr>
           <a:xfrm>
-            <a:off x="838199" y="611081"/>
-            <a:ext cx="10337801" cy="833663"/>
+            <a:off x="838199" y="611079"/>
+            <a:ext cx="10515600" cy="833663"/>
           </a:xfrm>
         </p:spPr>
         <p:txBody>
           <a:bodyPr/>
           <a:lstStyle/>
           <a:p>
+            <a:pPr algn="ctr"/>
             <a:r>
               <a:rPr lang="en-US" dirty="0" smtClean="0"/>
-              <a:t>                          Boolean Data type</a:t>
+              <a:t>Heap</a:t>
             </a:r>
             <a:endParaRPr lang="en-US" dirty="0"/>
           </a:p>
@@ -7949,64 +6964,38 @@
             <p:ph idx="1"/>
           </p:nvPr>
         </p:nvSpPr>
-        <p:spPr>
-          <a:xfrm>
-            <a:off x="838200" y="1825625"/>
-            <a:ext cx="10337800" cy="4351338"/>
-          </a:xfrm>
-        </p:spPr>
+        <p:spPr/>
         <p:txBody>
           <a:bodyPr>
             <a:normAutofit/>
           </a:bodyPr>
           <a:lstStyle/>
           <a:p>
-            <a:endParaRPr lang="en-US" dirty="0"/>
-          </a:p>
-          <a:p>
-            <a:r>
-              <a:rPr lang="en-US" sz="2800" b="1" dirty="0" smtClean="0"/>
-              <a:t>A Boolean data type represent value in the form of: </a:t>
-            </a:r>
-          </a:p>
-          <a:p>
-            <a:pPr lvl="1"/>
-            <a:r>
-              <a:rPr lang="en-US" sz="2600" b="1" dirty="0" smtClean="0"/>
-              <a:t>true</a:t>
-            </a:r>
-          </a:p>
-          <a:p>
-            <a:pPr lvl="1"/>
-            <a:r>
-              <a:rPr lang="en-US" sz="2600" b="1" dirty="0" smtClean="0"/>
-              <a:t>False</a:t>
-            </a:r>
-          </a:p>
-          <a:p>
-            <a:pPr lvl="1"/>
-            <a:endParaRPr lang="en-US" sz="2600" b="1" dirty="0"/>
-          </a:p>
-          <a:p>
-            <a:pPr lvl="1"/>
-            <a:endParaRPr lang="en-US" sz="2600" b="1" dirty="0" smtClean="0"/>
-          </a:p>
-          <a:p>
-            <a:pPr lvl="1"/>
-            <a:endParaRPr lang="en-US" sz="2600" b="1" dirty="0" smtClean="0"/>
-          </a:p>
-          <a:p>
-            <a:r>
-              <a:rPr lang="en-US" sz="2800" b="1" dirty="0" smtClean="0"/>
-              <a:t>It majorly used while taking decision and testing for a certain value to be true or false.</a:t>
-            </a:r>
-            <a:endParaRPr lang="en-US" dirty="0" smtClean="0"/>
-          </a:p>
-          <a:p>
-            <a:endParaRPr lang="en-US" dirty="0" smtClean="0"/>
-          </a:p>
-          <a:p>
-            <a:endParaRPr lang="en-US" noProof="1"/>
+            <a:r>
+              <a:rPr lang="en-US" sz="2800" dirty="0" smtClean="0"/>
+              <a:t>Heap is used for dynamic allocation of memory. </a:t>
+            </a:r>
+          </a:p>
+          <a:p>
+            <a:r>
+              <a:rPr lang="en-US" sz="2800" dirty="0" smtClean="0"/>
+              <a:t>Objects are always created on the heap memory.</a:t>
+            </a:r>
+          </a:p>
+          <a:p>
+            <a:r>
+              <a:rPr lang="en-US" sz="2800" dirty="0" smtClean="0"/>
+              <a:t>This is a shared memory and is shared by all threads currently executing.</a:t>
+            </a:r>
+          </a:p>
+          <a:p>
+            <a:r>
+              <a:rPr lang="en-US" sz="2800" dirty="0" smtClean="0"/>
+              <a:t>References point to these objects on the heap.</a:t>
+            </a:r>
+          </a:p>
+          <a:p>
+            <a:endParaRPr lang="en-US" sz="2800" dirty="0"/>
           </a:p>
         </p:txBody>
       </p:sp>
@@ -8057,7 +7046,7 @@
                 <a16:creationId xmlns:a16="http://schemas.microsoft.com/office/drawing/2014/main" id="{5F253864-26FA-4AB1-9F0A-4F57D870EE85}"/>
               </a:ext>
               <a:ext uri="{C183D7F6-B498-43B3-948B-1728B52AA6E4}">
-                <adec:decorative xmlns:adec="http://schemas.microsoft.com/office/drawing/2017/decorative" xmlns="" val="1"/>
+                <adec:decorative xmlns="" xmlns:adec="http://schemas.microsoft.com/office/drawing/2017/decorative" val="1"/>
               </a:ext>
             </a:extLst>
           </p:cNvPr>
@@ -8109,7 +7098,7 @@
       </p:sp>
       <p:pic>
         <p:nvPicPr>
-          <p:cNvPr id="8" name="Picture 7"/>
+          <p:cNvPr id="6" name="Picture 5"/>
           <p:cNvPicPr>
             <a:picLocks noChangeAspect="1"/>
           </p:cNvPicPr>
@@ -8129,8 +7118,8 @@
         </p:blipFill>
         <p:spPr>
           <a:xfrm>
-            <a:off x="4289857" y="2869766"/>
-            <a:ext cx="2466975" cy="1857375"/>
+            <a:off x="6871855" y="1825625"/>
+            <a:ext cx="4481944" cy="4351337"/>
           </a:xfrm>
           <a:prstGeom prst="rect">
             <a:avLst/>
@@ -8140,7 +7129,7 @@
     </p:spTree>
     <p:extLst>
       <p:ext uri="{BB962C8B-B14F-4D97-AF65-F5344CB8AC3E}">
-        <p14:creationId xmlns:p14="http://schemas.microsoft.com/office/powerpoint/2010/main" val="2966179024"/>
+        <p14:creationId xmlns:p14="http://schemas.microsoft.com/office/powerpoint/2010/main" val="1663849724"/>
       </p:ext>
     </p:extLst>
   </p:cSld>
@@ -8192,17 +7181,18 @@
         </p:nvSpPr>
         <p:spPr>
           <a:xfrm>
-            <a:off x="838199" y="611081"/>
-            <a:ext cx="10337801" cy="833663"/>
+            <a:off x="838200" y="641855"/>
+            <a:ext cx="10515600" cy="772107"/>
           </a:xfrm>
         </p:spPr>
         <p:txBody>
           <a:bodyPr/>
           <a:lstStyle/>
           <a:p>
+            <a:pPr algn="ctr"/>
             <a:r>
               <a:rPr lang="en-US" dirty="0" smtClean="0"/>
-              <a:t>                      Class : Complex Data types</a:t>
+              <a:t>Reference to Object</a:t>
             </a:r>
             <a:endParaRPr lang="en-US" dirty="0"/>
           </a:p>
@@ -8210,13 +7200,7 @@
       </p:sp>
       <p:sp>
         <p:nvSpPr>
-          <p:cNvPr id="3" name="Content Placeholder 2">
-            <a:extLst>
-              <a:ext uri="{FF2B5EF4-FFF2-40B4-BE49-F238E27FC236}">
-                <a16:creationId xmlns:a16="http://schemas.microsoft.com/office/drawing/2014/main" id="{FA6A4B49-27C8-46B6-8B11-AD7E8F615E2C}"/>
-              </a:ext>
-            </a:extLst>
-          </p:cNvPr>
+          <p:cNvPr id="6" name="Content Placeholder 5"/>
           <p:cNvSpPr>
             <a:spLocks noGrp="1"/>
           </p:cNvSpPr>
@@ -8227,38 +7211,67 @@
         <p:spPr/>
         <p:txBody>
           <a:bodyPr>
-            <a:normAutofit/>
+            <a:normAutofit fontScale="92500" lnSpcReduction="20000"/>
           </a:bodyPr>
           <a:lstStyle/>
           <a:p>
-            <a:endParaRPr lang="en-US" sz="2800" dirty="0" smtClean="0"/>
-          </a:p>
-          <a:p>
-            <a:endParaRPr lang="en-US" sz="2800" dirty="0"/>
-          </a:p>
-          <a:p>
-            <a:r>
-              <a:rPr lang="en-US" sz="2800" dirty="0" smtClean="0"/>
-              <a:t>Complex types are those that are built using the basic primitive data types in java.</a:t>
-            </a:r>
-          </a:p>
-          <a:p>
-            <a:r>
-              <a:rPr lang="en-US" sz="2800" dirty="0" smtClean="0"/>
-              <a:t>A class defines data type which can combine one or more primitive data types or more complex data types.</a:t>
-            </a:r>
-          </a:p>
-          <a:p>
-            <a:endParaRPr lang="en-US" dirty="0" smtClean="0"/>
-          </a:p>
-          <a:p>
-            <a:endParaRPr lang="en-US" dirty="0" smtClean="0"/>
-          </a:p>
-          <a:p>
-            <a:endParaRPr lang="en-US" dirty="0" smtClean="0"/>
-          </a:p>
-          <a:p>
-            <a:endParaRPr lang="en-US" noProof="1"/>
+            <a:r>
+              <a:rPr lang="en-US" sz="3200" dirty="0" smtClean="0"/>
+              <a:t>An instance of a class is called an object. Objects are created using new operator.</a:t>
+            </a:r>
+          </a:p>
+          <a:p>
+            <a:r>
+              <a:rPr lang="en-US" sz="3200" dirty="0" smtClean="0"/>
+              <a:t>A reference variable is like a pointer to an object of reference type.</a:t>
+            </a:r>
+          </a:p>
+          <a:p>
+            <a:r>
+              <a:rPr lang="en-US" sz="3200" dirty="0" smtClean="0"/>
+              <a:t>All operations on the object happens through the reference variable.</a:t>
+            </a:r>
+          </a:p>
+          <a:p>
+            <a:r>
+              <a:rPr lang="en-US" sz="3200" dirty="0" smtClean="0"/>
+              <a:t>A reference variable is similar to </a:t>
+            </a:r>
+            <a:r>
+              <a:rPr lang="en-US" sz="3200" dirty="0" err="1" smtClean="0"/>
+              <a:t>int</a:t>
+            </a:r>
+            <a:r>
+              <a:rPr lang="en-US" sz="3200" dirty="0" smtClean="0"/>
+              <a:t> variable as </a:t>
+            </a:r>
+            <a:r>
+              <a:rPr lang="en-US" sz="3200" dirty="0" err="1" smtClean="0"/>
+              <a:t>int</a:t>
+            </a:r>
+            <a:r>
+              <a:rPr lang="en-US" sz="3200" dirty="0" smtClean="0"/>
+              <a:t> variable stores a number and reference variable also stores a number but that number denotes the memory location of the object.</a:t>
+            </a:r>
+          </a:p>
+          <a:p>
+            <a:r>
+              <a:rPr lang="en-US" sz="3200" dirty="0" smtClean="0"/>
+              <a:t>Assigning ‘null’ to a reference variable in java means that , that reference variable does not point to any object.</a:t>
+            </a:r>
+            <a:endParaRPr lang="en-US" sz="2400" dirty="0" smtClean="0"/>
+          </a:p>
+          <a:p>
+            <a:endParaRPr lang="en-US" sz="2400" dirty="0" smtClean="0"/>
+          </a:p>
+          <a:p>
+            <a:endParaRPr lang="en-US" sz="2400" dirty="0" smtClean="0"/>
+          </a:p>
+          <a:p>
+            <a:endParaRPr lang="en-US" sz="2400" dirty="0" smtClean="0"/>
+          </a:p>
+          <a:p>
+            <a:endParaRPr lang="en-US" sz="2400" dirty="0" smtClean="0"/>
           </a:p>
         </p:txBody>
       </p:sp>
@@ -8278,12 +7291,7 @@
             <p:ph type="sldNum" sz="quarter" idx="10"/>
           </p:nvPr>
         </p:nvSpPr>
-        <p:spPr>
-          <a:xfrm>
-            <a:off x="11353800" y="6361475"/>
-            <a:ext cx="838200" cy="360000"/>
-          </a:xfrm>
-        </p:spPr>
+        <p:spPr/>
         <p:txBody>
           <a:bodyPr/>
           <a:lstStyle/>
@@ -8309,7 +7317,7 @@
                 <a16:creationId xmlns:a16="http://schemas.microsoft.com/office/drawing/2014/main" id="{5F253864-26FA-4AB1-9F0A-4F57D870EE85}"/>
               </a:ext>
               <a:ext uri="{C183D7F6-B498-43B3-948B-1728B52AA6E4}">
-                <adec:decorative xmlns:adec="http://schemas.microsoft.com/office/drawing/2017/decorative" xmlns="" val="1"/>
+                <adec:decorative xmlns="" xmlns:adec="http://schemas.microsoft.com/office/drawing/2017/decorative" val="1"/>
               </a:ext>
             </a:extLst>
           </p:cNvPr>
@@ -8362,7 +7370,7 @@
     </p:spTree>
     <p:extLst>
       <p:ext uri="{BB962C8B-B14F-4D97-AF65-F5344CB8AC3E}">
-        <p14:creationId xmlns:p14="http://schemas.microsoft.com/office/powerpoint/2010/main" val="650196804"/>
+        <p14:creationId xmlns:p14="http://schemas.microsoft.com/office/powerpoint/2010/main" val="274986115"/>
       </p:ext>
     </p:extLst>
   </p:cSld>
@@ -9257,6 +8265,24 @@
 </file>
 
 <file path=customXml/item1.xml><?xml version="1.0" encoding="utf-8"?>
+<p:properties xmlns:p="http://schemas.microsoft.com/office/2006/metadata/properties" xmlns:xsi="http://www.w3.org/2001/XMLSchema-instance" xmlns:pc="http://schemas.microsoft.com/office/infopath/2007/PartnerControls">
+  <documentManagement>
+    <Status xmlns="71af3243-3dd4-4a8d-8c0d-dd76da1f02a5">Not started</Status>
+    <MediaServiceKeyPoints xmlns="71af3243-3dd4-4a8d-8c0d-dd76da1f02a5" xsi:nil="true"/>
+  </documentManagement>
+</p:properties>
+</file>
+
+<file path=customXml/item2.xml><?xml version="1.0" encoding="utf-8"?>
+<?mso-contentType ?>
+<FormTemplates xmlns="http://schemas.microsoft.com/sharepoint/v3/contenttype/forms">
+  <Display>DocumentLibraryForm</Display>
+  <Edit>DocumentLibraryForm</Edit>
+  <New>DocumentLibraryForm</New>
+</FormTemplates>
+</file>
+
+<file path=customXml/item3.xml><?xml version="1.0" encoding="utf-8"?>
 <ct:contentTypeSchema xmlns:ct="http://schemas.microsoft.com/office/2006/metadata/contentType" xmlns:ma="http://schemas.microsoft.com/office/2006/metadata/properties/metaAttributes" ct:_="" ma:_="" ma:contentTypeName="Document" ma:contentTypeID="0x01010079F111ED35F8CC479449609E8A0923A6" ma:contentTypeVersion="12" ma:contentTypeDescription="Create a new document." ma:contentTypeScope="" ma:versionID="fa6e671f1cd7e4d96ff9652be322dd5e">
   <xsd:schema xmlns:xsd="http://www.w3.org/2001/XMLSchema" xmlns:xs="http://www.w3.org/2001/XMLSchema" xmlns:p="http://schemas.microsoft.com/office/2006/metadata/properties" xmlns:ns2="71af3243-3dd4-4a8d-8c0d-dd76da1f02a5" xmlns:ns3="16c05727-aa75-4e4a-9b5f-8a80a1165891" targetNamespace="http://schemas.microsoft.com/office/2006/metadata/properties" ma:root="true" ma:fieldsID="4e2496f70b101db0b8013f30a071bbf7" ns2:_="" ns3:_="">
     <xsd:import namespace="71af3243-3dd4-4a8d-8c0d-dd76da1f02a5"/>
@@ -9477,25 +8503,25 @@
 </ct:contentTypeSchema>
 </file>
 
-<file path=customXml/item2.xml><?xml version="1.0" encoding="utf-8"?>
-<?mso-contentType ?>
-<FormTemplates xmlns="http://schemas.microsoft.com/sharepoint/v3/contenttype/forms">
-  <Display>DocumentLibraryForm</Display>
-  <Edit>DocumentLibraryForm</Edit>
-  <New>DocumentLibraryForm</New>
-</FormTemplates>
+<file path=customXml/itemProps1.xml><?xml version="1.0" encoding="utf-8"?>
+<ds:datastoreItem xmlns:ds="http://schemas.openxmlformats.org/officeDocument/2006/customXml" ds:itemID="{F4E32C0B-4052-44CB-9341-8AD8B2CC4712}">
+  <ds:schemaRefs>
+    <ds:schemaRef ds:uri="http://schemas.microsoft.com/office/2006/metadata/properties"/>
+    <ds:schemaRef ds:uri="http://schemas.microsoft.com/office/infopath/2007/PartnerControls"/>
+    <ds:schemaRef ds:uri="71af3243-3dd4-4a8d-8c0d-dd76da1f02a5"/>
+  </ds:schemaRefs>
+</ds:datastoreItem>
 </file>
 
-<file path=customXml/item3.xml><?xml version="1.0" encoding="utf-8"?>
-<p:properties xmlns:p="http://schemas.microsoft.com/office/2006/metadata/properties" xmlns:xsi="http://www.w3.org/2001/XMLSchema-instance" xmlns:pc="http://schemas.microsoft.com/office/infopath/2007/PartnerControls">
-  <documentManagement>
-    <Status xmlns="71af3243-3dd4-4a8d-8c0d-dd76da1f02a5">Not started</Status>
-    <MediaServiceKeyPoints xmlns="71af3243-3dd4-4a8d-8c0d-dd76da1f02a5" xsi:nil="true"/>
-  </documentManagement>
-</p:properties>
+<file path=customXml/itemProps2.xml><?xml version="1.0" encoding="utf-8"?>
+<ds:datastoreItem xmlns:ds="http://schemas.openxmlformats.org/officeDocument/2006/customXml" ds:itemID="{EBB7C387-AFDC-4FE3-A658-984B7F35F155}">
+  <ds:schemaRefs>
+    <ds:schemaRef ds:uri="http://schemas.microsoft.com/sharepoint/v3/contenttype/forms"/>
+  </ds:schemaRefs>
+</ds:datastoreItem>
 </file>
 
-<file path=customXml/itemProps1.xml><?xml version="1.0" encoding="utf-8"?>
+<file path=customXml/itemProps3.xml><?xml version="1.0" encoding="utf-8"?>
 <ds:datastoreItem xmlns:ds="http://schemas.openxmlformats.org/officeDocument/2006/customXml" ds:itemID="{D6766BD6-F648-49AA-B7EC-13E75CECB99A}">
   <ds:schemaRefs>
     <ds:schemaRef ds:uri="http://schemas.microsoft.com/office/2006/metadata/contentType"/>
@@ -9512,22 +8538,4 @@
     <ds:schemaRef ds:uri="http://schemas.microsoft.com/internal/obd"/>
   </ds:schemaRefs>
 </ds:datastoreItem>
-</file>
-
-<file path=customXml/itemProps2.xml><?xml version="1.0" encoding="utf-8"?>
-<ds:datastoreItem xmlns:ds="http://schemas.openxmlformats.org/officeDocument/2006/customXml" ds:itemID="{EBB7C387-AFDC-4FE3-A658-984B7F35F155}">
-  <ds:schemaRefs>
-    <ds:schemaRef ds:uri="http://schemas.microsoft.com/sharepoint/v3/contenttype/forms"/>
-  </ds:schemaRefs>
-</ds:datastoreItem>
-</file>
-
-<file path=customXml/itemProps3.xml><?xml version="1.0" encoding="utf-8"?>
-<ds:datastoreItem xmlns:ds="http://schemas.openxmlformats.org/officeDocument/2006/customXml" ds:itemID="{F4E32C0B-4052-44CB-9341-8AD8B2CC4712}">
-  <ds:schemaRefs>
-    <ds:schemaRef ds:uri="http://schemas.microsoft.com/office/2006/metadata/properties"/>
-    <ds:schemaRef ds:uri="http://schemas.microsoft.com/office/infopath/2007/PartnerControls"/>
-    <ds:schemaRef ds:uri="71af3243-3dd4-4a8d-8c0d-dd76da1f02a5"/>
-  </ds:schemaRefs>
-</ds:datastoreItem>
 </file>
</xml_diff>